<commit_message>
Added slided to Css Basics
</commit_message>
<xml_diff>
--- a/02.css-basics.pptx
+++ b/02.css-basics.pptx
@@ -112,6 +112,11 @@
       </a:defRPr>
     </a:lvl9pPr>
   </p:defaultTextStyle>
+  <p:extLst>
+    <p:ext uri="{EFAFB233-063F-42B5-8137-9DF3F51BA10A}">
+      <p15:sldGuideLst xmlns:p15="http://schemas.microsoft.com/office/powerpoint/2012/main"/>
+    </p:ext>
+  </p:extLst>
 </p:presentation>
 </file>
 
@@ -6719,13 +6724,29 @@
           <a:bodyPr/>
           <a:lstStyle/>
           <a:p>
-            <a:endParaRPr lang="en-US"/>
-          </a:p>
-        </p:txBody>
-      </p:sp>
-      <p:sp>
-        <p:nvSpPr>
-          <p:cNvPr id="3" name="Content Placeholder 2"/>
+            <a:r>
+              <a:rPr lang="bg-BG" dirty="0" smtClean="0"/>
+              <a:t>Други </a:t>
+            </a:r>
+            <a:r>
+              <a:rPr lang="en-US" dirty="0" err="1" smtClean="0"/>
+              <a:t>css</a:t>
+            </a:r>
+            <a:r>
+              <a:rPr lang="en-US" dirty="0" smtClean="0"/>
+              <a:t> </a:t>
+            </a:r>
+            <a:r>
+              <a:rPr lang="bg-BG" dirty="0" smtClean="0"/>
+              <a:t>селектори</a:t>
+            </a:r>
+            <a:endParaRPr lang="en-US" dirty="0"/>
+          </a:p>
+        </p:txBody>
+      </p:sp>
+      <p:sp>
+        <p:nvSpPr>
+          <p:cNvPr id="4" name="Content Placeholder 2"/>
           <p:cNvSpPr>
             <a:spLocks noGrp="1"/>
           </p:cNvSpPr>
@@ -6733,12 +6754,167 @@
             <p:ph sz="quarter" idx="13"/>
           </p:nvPr>
         </p:nvSpPr>
-        <p:spPr/>
-        <p:txBody>
-          <a:bodyPr/>
-          <a:lstStyle/>
-          <a:p>
-            <a:endParaRPr lang="en-US"/>
+        <p:spPr>
+          <a:xfrm>
+            <a:off x="913774" y="2367092"/>
+            <a:ext cx="10363826" cy="4322032"/>
+          </a:xfrm>
+        </p:spPr>
+        <p:txBody>
+          <a:bodyPr>
+            <a:normAutofit/>
+          </a:bodyPr>
+          <a:lstStyle/>
+          <a:p>
+            <a:r>
+              <a:rPr lang="bg-BG" dirty="0" smtClean="0"/>
+              <a:t>Комбинация от </a:t>
+            </a:r>
+            <a:r>
+              <a:rPr lang="en-US" dirty="0" smtClean="0"/>
+              <a:t>tag </a:t>
+            </a:r>
+            <a:r>
+              <a:rPr lang="bg-BG" dirty="0" smtClean="0"/>
+              <a:t>и клас или от </a:t>
+            </a:r>
+            <a:r>
+              <a:rPr lang="en-US" dirty="0" smtClean="0"/>
+              <a:t>tag </a:t>
+            </a:r>
+            <a:r>
+              <a:rPr lang="bg-BG" dirty="0" smtClean="0"/>
+              <a:t>и </a:t>
+            </a:r>
+            <a:r>
+              <a:rPr lang="en-US" dirty="0" smtClean="0"/>
+              <a:t>id</a:t>
+            </a:r>
+            <a:r>
+              <a:rPr lang="bg-BG" dirty="0"/>
+              <a:t>:</a:t>
+            </a:r>
+            <a:r>
+              <a:rPr lang="bg-BG" dirty="0" smtClean="0"/>
+              <a:t> </a:t>
+            </a:r>
+            <a:r>
+              <a:rPr lang="en-US" dirty="0" smtClean="0"/>
+              <a:t>p.my-class, </a:t>
+            </a:r>
+            <a:r>
+              <a:rPr lang="en-US" dirty="0" err="1" smtClean="0"/>
+              <a:t>p#first-id</a:t>
+            </a:r>
+            <a:endParaRPr lang="en-US" dirty="0" smtClean="0"/>
+          </a:p>
+          <a:p>
+            <a:r>
+              <a:rPr lang="bg-BG" dirty="0" smtClean="0"/>
+              <a:t>Вложен селектор</a:t>
+            </a:r>
+            <a:r>
+              <a:rPr lang="bg-BG" dirty="0"/>
+              <a:t>:</a:t>
+            </a:r>
+            <a:r>
+              <a:rPr lang="en-US" dirty="0" smtClean="0"/>
+              <a:t> body div</a:t>
+            </a:r>
+          </a:p>
+          <a:p>
+            <a:r>
+              <a:rPr lang="bg-BG" dirty="0" smtClean="0"/>
+              <a:t>Селектор *</a:t>
+            </a:r>
+          </a:p>
+          <a:p>
+            <a:r>
+              <a:rPr lang="bg-BG" dirty="0" smtClean="0"/>
+              <a:t>Селектор за директни деца: </a:t>
+            </a:r>
+            <a:r>
+              <a:rPr lang="en-US" dirty="0" smtClean="0"/>
+              <a:t>div &gt; p</a:t>
+            </a:r>
+          </a:p>
+          <a:p>
+            <a:r>
+              <a:rPr lang="bg-BG" dirty="0" smtClean="0"/>
+              <a:t>Селектор за съседни елементи: </a:t>
+            </a:r>
+            <a:r>
+              <a:rPr lang="en-US" dirty="0" err="1" smtClean="0"/>
+              <a:t>img</a:t>
+            </a:r>
+            <a:r>
+              <a:rPr lang="en-US" dirty="0" smtClean="0"/>
+              <a:t> + div</a:t>
+            </a:r>
+          </a:p>
+          <a:p>
+            <a:r>
+              <a:rPr lang="bg-BG" dirty="0" smtClean="0"/>
+              <a:t>Селектор за  атрибути</a:t>
+            </a:r>
+            <a:r>
+              <a:rPr lang="en-US" dirty="0" smtClean="0"/>
+              <a:t>: </a:t>
+            </a:r>
+            <a:r>
+              <a:rPr lang="en-US" dirty="0"/>
+              <a:t>input[type="button</a:t>
+            </a:r>
+            <a:r>
+              <a:rPr lang="en-US" dirty="0" smtClean="0"/>
+              <a:t>"]</a:t>
+            </a:r>
+            <a:endParaRPr lang="bg-BG" dirty="0" smtClean="0"/>
+          </a:p>
+          <a:p>
+            <a:r>
+              <a:rPr lang="bg-BG" dirty="0" smtClean="0"/>
+              <a:t>Информация за останалите </a:t>
+            </a:r>
+            <a:r>
+              <a:rPr lang="en-US" dirty="0" err="1" smtClean="0"/>
+              <a:t>css</a:t>
+            </a:r>
+            <a:r>
+              <a:rPr lang="en-US" dirty="0" smtClean="0"/>
+              <a:t> </a:t>
+            </a:r>
+            <a:r>
+              <a:rPr lang="bg-BG" dirty="0" smtClean="0"/>
+              <a:t>селектори може да намерите тук:</a:t>
+            </a:r>
+          </a:p>
+          <a:p>
+            <a:pPr marL="0" indent="0">
+              <a:buNone/>
+            </a:pPr>
+            <a:r>
+              <a:rPr lang="en-US" dirty="0">
+                <a:hlinkClick r:id="rId2"/>
+              </a:rPr>
+              <a:t>http://</a:t>
+            </a:r>
+            <a:r>
+              <a:rPr lang="en-US" dirty="0" smtClean="0">
+                <a:hlinkClick r:id="rId2"/>
+              </a:rPr>
+              <a:t>www.w3schools.com/cssref/css_selectors.asp</a:t>
+            </a:r>
+            <a:endParaRPr lang="bg-BG" dirty="0" smtClean="0"/>
+          </a:p>
+          <a:p>
+            <a:pPr marL="0" indent="0">
+              <a:buNone/>
+            </a:pPr>
+            <a:endParaRPr lang="bg-BG" dirty="0" smtClean="0"/>
+          </a:p>
+          <a:p>
+            <a:endParaRPr lang="en-US" dirty="0"/>
           </a:p>
         </p:txBody>
       </p:sp>
@@ -6782,34 +6958,81 @@
             <p:ph type="title"/>
           </p:nvPr>
         </p:nvSpPr>
-        <p:spPr/>
-        <p:txBody>
-          <a:bodyPr/>
-          <a:lstStyle/>
-          <a:p>
-            <a:endParaRPr lang="en-US"/>
-          </a:p>
-        </p:txBody>
-      </p:sp>
-      <p:sp>
-        <p:nvSpPr>
-          <p:cNvPr id="3" name="Content Placeholder 2"/>
-          <p:cNvSpPr>
-            <a:spLocks noGrp="1"/>
-          </p:cNvSpPr>
-          <p:nvPr>
-            <p:ph sz="quarter" idx="13"/>
-          </p:nvPr>
-        </p:nvSpPr>
-        <p:spPr/>
-        <p:txBody>
-          <a:bodyPr/>
-          <a:lstStyle/>
-          <a:p>
-            <a:endParaRPr lang="en-US"/>
-          </a:p>
-        </p:txBody>
-      </p:sp>
+        <p:spPr>
+          <a:xfrm>
+            <a:off x="946726" y="91296"/>
+            <a:ext cx="10364451" cy="724251"/>
+          </a:xfrm>
+        </p:spPr>
+        <p:txBody>
+          <a:bodyPr/>
+          <a:lstStyle/>
+          <a:p>
+            <a:r>
+              <a:rPr lang="bg-BG" dirty="0" smtClean="0"/>
+              <a:t>Други </a:t>
+            </a:r>
+            <a:r>
+              <a:rPr lang="en-US" dirty="0" err="1" smtClean="0"/>
+              <a:t>Css</a:t>
+            </a:r>
+            <a:r>
+              <a:rPr lang="en-US" dirty="0" smtClean="0"/>
+              <a:t> </a:t>
+            </a:r>
+            <a:r>
+              <a:rPr lang="bg-BG" dirty="0" smtClean="0"/>
+              <a:t>селектори </a:t>
+            </a:r>
+            <a:r>
+              <a:rPr lang="bg-BG" dirty="0" smtClean="0"/>
+              <a:t>демо</a:t>
+            </a:r>
+            <a:endParaRPr lang="en-US" dirty="0"/>
+          </a:p>
+        </p:txBody>
+      </p:sp>
+      <p:pic>
+        <p:nvPicPr>
+          <p:cNvPr id="1026" name="Picture 2" descr="http://thecodeistrueorfalse.files.wordpress.com/2013/10/htmlcss-templates1.jpg"/>
+          <p:cNvPicPr>
+            <a:picLocks noChangeAspect="1" noChangeArrowheads="1"/>
+          </p:cNvPicPr>
+          <p:nvPr/>
+        </p:nvPicPr>
+        <p:blipFill>
+          <a:blip r:embed="rId2">
+            <a:extLst>
+              <a:ext uri="{28A0092B-C50C-407E-A947-70E740481C1C}">
+                <a14:useLocalDpi xmlns:a14="http://schemas.microsoft.com/office/drawing/2010/main" val="0"/>
+              </a:ext>
+            </a:extLst>
+          </a:blip>
+          <a:srcRect/>
+          <a:stretch>
+            <a:fillRect/>
+          </a:stretch>
+        </p:blipFill>
+        <p:spPr bwMode="auto">
+          <a:xfrm>
+            <a:off x="3271451" y="815547"/>
+            <a:ext cx="5715000" cy="5715000"/>
+          </a:xfrm>
+          <a:prstGeom prst="rect">
+            <a:avLst/>
+          </a:prstGeom>
+          <a:noFill/>
+          <a:extLst>
+            <a:ext uri="{909E8E84-426E-40DD-AFC4-6F175D3DCCD1}">
+              <a14:hiddenFill xmlns:a14="http://schemas.microsoft.com/office/drawing/2010/main">
+                <a:solidFill>
+                  <a:srgbClr val="FFFFFF"/>
+                </a:solidFill>
+              </a14:hiddenFill>
+            </a:ext>
+          </a:extLst>
+        </p:spPr>
+      </p:pic>
     </p:spTree>
     <p:extLst>
       <p:ext uri="{BB962C8B-B14F-4D97-AF65-F5344CB8AC3E}">
@@ -6855,7 +7078,19 @@
           <a:bodyPr/>
           <a:lstStyle/>
           <a:p>
-            <a:endParaRPr lang="en-US"/>
+            <a:r>
+              <a:rPr lang="en-US" dirty="0" err="1" smtClean="0"/>
+              <a:t>Css</a:t>
+            </a:r>
+            <a:r>
+              <a:rPr lang="en-US" dirty="0" smtClean="0"/>
+              <a:t> </a:t>
+            </a:r>
+            <a:r>
+              <a:rPr lang="bg-BG" dirty="0" smtClean="0"/>
+              <a:t>стойности</a:t>
+            </a:r>
+            <a:endParaRPr lang="en-US" dirty="0"/>
           </a:p>
         </p:txBody>
       </p:sp>
@@ -6874,7 +7109,55 @@
           <a:bodyPr/>
           <a:lstStyle/>
           <a:p>
-            <a:endParaRPr lang="en-US"/>
+            <a:r>
+              <a:rPr lang="bg-BG" dirty="0" smtClean="0"/>
+              <a:t>Всички стойности представляват двойки ключ стойност</a:t>
+            </a:r>
+          </a:p>
+          <a:p>
+            <a:r>
+              <a:rPr lang="bg-BG" dirty="0" smtClean="0"/>
+              <a:t>Някой </a:t>
+            </a:r>
+            <a:r>
+              <a:rPr lang="en-US" dirty="0" err="1" smtClean="0"/>
+              <a:t>css</a:t>
+            </a:r>
+            <a:r>
+              <a:rPr lang="en-US" dirty="0" smtClean="0"/>
+              <a:t> </a:t>
+            </a:r>
+            <a:r>
+              <a:rPr lang="bg-BG" dirty="0" smtClean="0"/>
+              <a:t>стойности важат за всички елементи, други са предназначени за определен тип такива</a:t>
+            </a:r>
+          </a:p>
+          <a:p>
+            <a:r>
+              <a:rPr lang="en-US" dirty="0" err="1" smtClean="0"/>
+              <a:t>Css</a:t>
+            </a:r>
+            <a:r>
+              <a:rPr lang="en-US" dirty="0" smtClean="0"/>
+              <a:t> </a:t>
+            </a:r>
+            <a:r>
+              <a:rPr lang="bg-BG" dirty="0" smtClean="0"/>
+              <a:t>може да определя – </a:t>
+            </a:r>
+            <a:r>
+              <a:rPr lang="bg-BG" dirty="0" smtClean="0"/>
+              <a:t>отстояние</a:t>
+            </a:r>
+            <a:r>
+              <a:rPr lang="en-US" dirty="0" smtClean="0"/>
+              <a:t>, </a:t>
+            </a:r>
+            <a:r>
+              <a:rPr lang="bg-BG" dirty="0" smtClean="0"/>
+              <a:t>цвят, размери, граници, шрифт, формат и др.</a:t>
+            </a:r>
+            <a:endParaRPr lang="bg-BG" dirty="0" smtClean="0"/>
           </a:p>
         </p:txBody>
       </p:sp>
@@ -6923,7 +7206,19 @@
           <a:bodyPr/>
           <a:lstStyle/>
           <a:p>
-            <a:endParaRPr lang="en-US"/>
+            <a:r>
+              <a:rPr lang="en-US" dirty="0" err="1"/>
+              <a:t>Css</a:t>
+            </a:r>
+            <a:r>
+              <a:rPr lang="en-US" dirty="0"/>
+              <a:t> </a:t>
+            </a:r>
+            <a:r>
+              <a:rPr lang="bg-BG" dirty="0"/>
+              <a:t>стойности</a:t>
+            </a:r>
+            <a:endParaRPr lang="en-US" dirty="0"/>
           </a:p>
         </p:txBody>
       </p:sp>
@@ -6942,7 +7237,7 @@
           <a:bodyPr/>
           <a:lstStyle/>
           <a:p>
-            <a:endParaRPr lang="en-US"/>
+            <a:endParaRPr lang="en-US" dirty="0"/>
           </a:p>
         </p:txBody>
       </p:sp>

</xml_diff>

<commit_message>
Modified Css Basics Presentation
</commit_message>
<xml_diff>
--- a/02.css-basics.pptx
+++ b/02.css-basics.pptx
@@ -17,7 +17,6 @@
     <p:sldId id="265" r:id="rId11"/>
     <p:sldId id="268" r:id="rId12"/>
     <p:sldId id="266" r:id="rId13"/>
-    <p:sldId id="267" r:id="rId14"/>
   </p:sldIdLst>
   <p:sldSz cx="12192000" cy="6858000"/>
   <p:notesSz cx="6858000" cy="9144000"/>
@@ -6515,74 +6514,6 @@
 </p:sld>
 </file>
 
-<file path=ppt/slides/slide13.xml><?xml version="1.0" encoding="utf-8"?>
-<p:sld xmlns:a="http://schemas.openxmlformats.org/drawingml/2006/main" xmlns:r="http://schemas.openxmlformats.org/officeDocument/2006/relationships" xmlns:p="http://schemas.openxmlformats.org/presentationml/2006/main">
-  <p:cSld>
-    <p:spTree>
-      <p:nvGrpSpPr>
-        <p:cNvPr id="1" name=""/>
-        <p:cNvGrpSpPr/>
-        <p:nvPr/>
-      </p:nvGrpSpPr>
-      <p:grpSpPr>
-        <a:xfrm>
-          <a:off x="0" y="0"/>
-          <a:ext cx="0" cy="0"/>
-          <a:chOff x="0" y="0"/>
-          <a:chExt cx="0" cy="0"/>
-        </a:xfrm>
-      </p:grpSpPr>
-      <p:sp>
-        <p:nvSpPr>
-          <p:cNvPr id="2" name="Title 1"/>
-          <p:cNvSpPr>
-            <a:spLocks noGrp="1"/>
-          </p:cNvSpPr>
-          <p:nvPr>
-            <p:ph type="title"/>
-          </p:nvPr>
-        </p:nvSpPr>
-        <p:spPr/>
-        <p:txBody>
-          <a:bodyPr/>
-          <a:lstStyle/>
-          <a:p>
-            <a:endParaRPr lang="en-US" dirty="0"/>
-          </a:p>
-        </p:txBody>
-      </p:sp>
-      <p:sp>
-        <p:nvSpPr>
-          <p:cNvPr id="3" name="Content Placeholder 2"/>
-          <p:cNvSpPr>
-            <a:spLocks noGrp="1"/>
-          </p:cNvSpPr>
-          <p:nvPr>
-            <p:ph sz="quarter" idx="13"/>
-          </p:nvPr>
-        </p:nvSpPr>
-        <p:spPr/>
-        <p:txBody>
-          <a:bodyPr/>
-          <a:lstStyle/>
-          <a:p>
-            <a:endParaRPr lang="en-US"/>
-          </a:p>
-        </p:txBody>
-      </p:sp>
-    </p:spTree>
-    <p:extLst>
-      <p:ext uri="{BB962C8B-B14F-4D97-AF65-F5344CB8AC3E}">
-        <p14:creationId xmlns:p14="http://schemas.microsoft.com/office/powerpoint/2010/main" val="2693450529"/>
-      </p:ext>
-    </p:extLst>
-  </p:cSld>
-  <p:clrMapOvr>
-    <a:masterClrMapping/>
-  </p:clrMapOvr>
-</p:sld>
-</file>
-
 <file path=ppt/slides/slide2.xml><?xml version="1.0" encoding="utf-8"?>
 <p:sld xmlns:a="http://schemas.openxmlformats.org/drawingml/2006/main" xmlns:r="http://schemas.openxmlformats.org/officeDocument/2006/relationships" xmlns:p="http://schemas.openxmlformats.org/presentationml/2006/main">
   <p:cSld>

</xml_diff>

<commit_message>
Finalized CSS Basics Lection and examples
</commit_message>
<xml_diff>
--- a/02.css-basics.pptx
+++ b/02.css-basics.pptx
@@ -8,15 +8,21 @@
     <p:sldId id="256" r:id="rId2"/>
     <p:sldId id="257" r:id="rId3"/>
     <p:sldId id="258" r:id="rId4"/>
-    <p:sldId id="259" r:id="rId5"/>
-    <p:sldId id="260" r:id="rId6"/>
-    <p:sldId id="261" r:id="rId7"/>
-    <p:sldId id="262" r:id="rId8"/>
-    <p:sldId id="263" r:id="rId9"/>
-    <p:sldId id="264" r:id="rId10"/>
-    <p:sldId id="265" r:id="rId11"/>
-    <p:sldId id="268" r:id="rId12"/>
-    <p:sldId id="266" r:id="rId13"/>
+    <p:sldId id="274" r:id="rId5"/>
+    <p:sldId id="259" r:id="rId6"/>
+    <p:sldId id="260" r:id="rId7"/>
+    <p:sldId id="261" r:id="rId8"/>
+    <p:sldId id="262" r:id="rId9"/>
+    <p:sldId id="263" r:id="rId10"/>
+    <p:sldId id="264" r:id="rId11"/>
+    <p:sldId id="265" r:id="rId12"/>
+    <p:sldId id="268" r:id="rId13"/>
+    <p:sldId id="266" r:id="rId14"/>
+    <p:sldId id="269" r:id="rId15"/>
+    <p:sldId id="270" r:id="rId16"/>
+    <p:sldId id="271" r:id="rId17"/>
+    <p:sldId id="272" r:id="rId18"/>
+    <p:sldId id="273" r:id="rId19"/>
   </p:sldIdLst>
   <p:sldSz cx="12192000" cy="6858000"/>
   <p:notesSz cx="6858000" cy="9144000"/>
@@ -294,7 +300,7 @@
           <a:p>
             <a:fld id="{5BB930E1-A780-4904-8CE4-6EDEFF637E4F}" type="datetimeFigureOut">
               <a:rPr lang="en-US" smtClean="0"/>
-              <a:t>11/12/2014</a:t>
+              <a:t>11/13/2014</a:t>
             </a:fld>
             <a:endParaRPr lang="en-US"/>
           </a:p>
@@ -606,7 +612,7 @@
           <a:p>
             <a:fld id="{5BB930E1-A780-4904-8CE4-6EDEFF637E4F}" type="datetimeFigureOut">
               <a:rPr lang="en-US" smtClean="0"/>
-              <a:t>11/12/2014</a:t>
+              <a:t>11/13/2014</a:t>
             </a:fld>
             <a:endParaRPr lang="en-US"/>
           </a:p>
@@ -828,7 +834,7 @@
           <a:p>
             <a:fld id="{5BB930E1-A780-4904-8CE4-6EDEFF637E4F}" type="datetimeFigureOut">
               <a:rPr lang="en-US" smtClean="0"/>
-              <a:t>11/12/2014</a:t>
+              <a:t>11/13/2014</a:t>
             </a:fld>
             <a:endParaRPr lang="en-US"/>
           </a:p>
@@ -1119,7 +1125,7 @@
           <a:p>
             <a:fld id="{5BB930E1-A780-4904-8CE4-6EDEFF637E4F}" type="datetimeFigureOut">
               <a:rPr lang="en-US" smtClean="0"/>
-              <a:t>11/12/2014</a:t>
+              <a:t>11/13/2014</a:t>
             </a:fld>
             <a:endParaRPr lang="en-US"/>
           </a:p>
@@ -1573,7 +1579,7 @@
           <a:p>
             <a:fld id="{5BB930E1-A780-4904-8CE4-6EDEFF637E4F}" type="datetimeFigureOut">
               <a:rPr lang="en-US" smtClean="0"/>
-              <a:t>11/12/2014</a:t>
+              <a:t>11/13/2014</a:t>
             </a:fld>
             <a:endParaRPr lang="en-US"/>
           </a:p>
@@ -2149,7 +2155,7 @@
           <a:p>
             <a:fld id="{5BB930E1-A780-4904-8CE4-6EDEFF637E4F}" type="datetimeFigureOut">
               <a:rPr lang="en-US" smtClean="0"/>
-              <a:t>11/12/2014</a:t>
+              <a:t>11/13/2014</a:t>
             </a:fld>
             <a:endParaRPr lang="en-US"/>
           </a:p>
@@ -3001,7 +3007,7 @@
           <a:p>
             <a:fld id="{5BB930E1-A780-4904-8CE4-6EDEFF637E4F}" type="datetimeFigureOut">
               <a:rPr lang="en-US" smtClean="0"/>
-              <a:t>11/12/2014</a:t>
+              <a:t>11/13/2014</a:t>
             </a:fld>
             <a:endParaRPr lang="en-US"/>
           </a:p>
@@ -3206,7 +3212,7 @@
           <a:p>
             <a:fld id="{5BB930E1-A780-4904-8CE4-6EDEFF637E4F}" type="datetimeFigureOut">
               <a:rPr lang="en-US" smtClean="0"/>
-              <a:t>11/12/2014</a:t>
+              <a:t>11/13/2014</a:t>
             </a:fld>
             <a:endParaRPr lang="en-US"/>
           </a:p>
@@ -3420,7 +3426,7 @@
           <a:p>
             <a:fld id="{5BB930E1-A780-4904-8CE4-6EDEFF637E4F}" type="datetimeFigureOut">
               <a:rPr lang="en-US" smtClean="0"/>
-              <a:t>11/12/2014</a:t>
+              <a:t>11/13/2014</a:t>
             </a:fld>
             <a:endParaRPr lang="en-US"/>
           </a:p>
@@ -3625,7 +3631,7 @@
           <a:p>
             <a:fld id="{5BB930E1-A780-4904-8CE4-6EDEFF637E4F}" type="datetimeFigureOut">
               <a:rPr lang="en-US" smtClean="0"/>
-              <a:t>11/12/2014</a:t>
+              <a:t>11/13/2014</a:t>
             </a:fld>
             <a:endParaRPr lang="en-US"/>
           </a:p>
@@ -3905,7 +3911,7 @@
           <a:p>
             <a:fld id="{5BB930E1-A780-4904-8CE4-6EDEFF637E4F}" type="datetimeFigureOut">
               <a:rPr lang="en-US" smtClean="0"/>
-              <a:t>11/12/2014</a:t>
+              <a:t>11/13/2014</a:t>
             </a:fld>
             <a:endParaRPr lang="en-US"/>
           </a:p>
@@ -4172,7 +4178,7 @@
           <a:p>
             <a:fld id="{5BB930E1-A780-4904-8CE4-6EDEFF637E4F}" type="datetimeFigureOut">
               <a:rPr lang="en-US" smtClean="0"/>
-              <a:t>11/12/2014</a:t>
+              <a:t>11/13/2014</a:t>
             </a:fld>
             <a:endParaRPr lang="en-US"/>
           </a:p>
@@ -4587,7 +4593,7 @@
           <a:p>
             <a:fld id="{5BB930E1-A780-4904-8CE4-6EDEFF637E4F}" type="datetimeFigureOut">
               <a:rPr lang="en-US" smtClean="0"/>
-              <a:t>11/12/2014</a:t>
+              <a:t>11/13/2014</a:t>
             </a:fld>
             <a:endParaRPr lang="en-US"/>
           </a:p>
@@ -4735,7 +4741,7 @@
           <a:p>
             <a:fld id="{5BB930E1-A780-4904-8CE4-6EDEFF637E4F}" type="datetimeFigureOut">
               <a:rPr lang="en-US" smtClean="0"/>
-              <a:t>11/12/2014</a:t>
+              <a:t>11/13/2014</a:t>
             </a:fld>
             <a:endParaRPr lang="en-US"/>
           </a:p>
@@ -4860,7 +4866,7 @@
           <a:p>
             <a:fld id="{5BB930E1-A780-4904-8CE4-6EDEFF637E4F}" type="datetimeFigureOut">
               <a:rPr lang="en-US" smtClean="0"/>
-              <a:t>11/12/2014</a:t>
+              <a:t>11/13/2014</a:t>
             </a:fld>
             <a:endParaRPr lang="en-US"/>
           </a:p>
@@ -5139,7 +5145,7 @@
           <a:p>
             <a:fld id="{5BB930E1-A780-4904-8CE4-6EDEFF637E4F}" type="datetimeFigureOut">
               <a:rPr lang="en-US" smtClean="0"/>
-              <a:t>11/12/2014</a:t>
+              <a:t>11/13/2014</a:t>
             </a:fld>
             <a:endParaRPr lang="en-US"/>
           </a:p>
@@ -5451,7 +5457,7 @@
           <a:p>
             <a:fld id="{5BB930E1-A780-4904-8CE4-6EDEFF637E4F}" type="datetimeFigureOut">
               <a:rPr lang="en-US" smtClean="0"/>
-              <a:t>11/12/2014</a:t>
+              <a:t>11/13/2014</a:t>
             </a:fld>
             <a:endParaRPr lang="en-US"/>
           </a:p>
@@ -5704,7 +5710,7 @@
           <a:p>
             <a:fld id="{5BB930E1-A780-4904-8CE4-6EDEFF637E4F}" type="datetimeFigureOut">
               <a:rPr lang="en-US" smtClean="0"/>
-              <a:t>11/12/2014</a:t>
+              <a:t>11/13/2014</a:t>
             </a:fld>
             <a:endParaRPr lang="en-US"/>
           </a:p>
@@ -6238,73 +6244,66 @@
             <p:ph type="title"/>
           </p:nvPr>
         </p:nvSpPr>
-        <p:spPr>
-          <a:xfrm>
-            <a:off x="938488" y="247816"/>
-            <a:ext cx="10364451" cy="658348"/>
-          </a:xfrm>
-        </p:spPr>
-        <p:txBody>
-          <a:bodyPr/>
-          <a:lstStyle/>
-          <a:p>
-            <a:r>
-              <a:rPr lang="en-US" dirty="0" smtClean="0"/>
-              <a:t>CSS </a:t>
+        <p:spPr/>
+        <p:txBody>
+          <a:bodyPr/>
+          <a:lstStyle/>
+          <a:p>
+            <a:r>
+              <a:rPr lang="en-US" dirty="0" err="1"/>
+              <a:t>Css</a:t>
+            </a:r>
+            <a:r>
+              <a:rPr lang="en-US" dirty="0"/>
+              <a:t> </a:t>
             </a:r>
             <a:r>
               <a:rPr lang="bg-BG" dirty="0" smtClean="0"/>
-              <a:t>Цветове Демо</a:t>
+              <a:t>стойности за цвят</a:t>
             </a:r>
             <a:endParaRPr lang="en-US" dirty="0"/>
           </a:p>
         </p:txBody>
       </p:sp>
-      <p:pic>
-        <p:nvPicPr>
-          <p:cNvPr id="1026" name="Picture 2" descr="http://www.gavick.com/documentation/wp-content/uploads/2013/09/colors-table.png"/>
-          <p:cNvPicPr>
-            <a:picLocks noChangeAspect="1" noChangeArrowheads="1"/>
-          </p:cNvPicPr>
-          <p:nvPr/>
-        </p:nvPicPr>
-        <p:blipFill>
-          <a:blip r:embed="rId2">
-            <a:extLst>
-              <a:ext uri="{28A0092B-C50C-407E-A947-70E740481C1C}">
-                <a14:useLocalDpi xmlns:a14="http://schemas.microsoft.com/office/drawing/2010/main" val="0"/>
-              </a:ext>
-            </a:extLst>
-          </a:blip>
-          <a:srcRect/>
-          <a:stretch>
-            <a:fillRect/>
-          </a:stretch>
-        </p:blipFill>
-        <p:spPr bwMode="auto">
-          <a:xfrm>
-            <a:off x="629509" y="1882646"/>
-            <a:ext cx="10982407" cy="4180402"/>
-          </a:xfrm>
-          <a:prstGeom prst="rect">
-            <a:avLst/>
-          </a:prstGeom>
-          <a:noFill/>
-          <a:extLst>
-            <a:ext uri="{909E8E84-426E-40DD-AFC4-6F175D3DCCD1}">
-              <a14:hiddenFill xmlns:a14="http://schemas.microsoft.com/office/drawing/2010/main">
-                <a:solidFill>
-                  <a:srgbClr val="FFFFFF"/>
-                </a:solidFill>
-              </a14:hiddenFill>
-            </a:ext>
-          </a:extLst>
-        </p:spPr>
-      </p:pic>
+      <p:sp>
+        <p:nvSpPr>
+          <p:cNvPr id="3" name="Content Placeholder 2"/>
+          <p:cNvSpPr>
+            <a:spLocks noGrp="1"/>
+          </p:cNvSpPr>
+          <p:nvPr>
+            <p:ph sz="quarter" idx="13"/>
+          </p:nvPr>
+        </p:nvSpPr>
+        <p:spPr/>
+        <p:txBody>
+          <a:bodyPr/>
+          <a:lstStyle/>
+          <a:p>
+            <a:r>
+              <a:rPr lang="bg-BG" dirty="0" smtClean="0"/>
+              <a:t>Видове стойности</a:t>
+            </a:r>
+          </a:p>
+          <a:p>
+            <a:r>
+              <a:rPr lang="bg-BG" dirty="0" smtClean="0"/>
+              <a:t>Видове цветове</a:t>
+            </a:r>
+          </a:p>
+          <a:p>
+            <a:r>
+              <a:rPr lang="bg-BG" dirty="0" smtClean="0"/>
+              <a:t>Добри практики</a:t>
+            </a:r>
+            <a:endParaRPr lang="en-US" dirty="0"/>
+          </a:p>
+        </p:txBody>
+      </p:sp>
     </p:spTree>
     <p:extLst>
       <p:ext uri="{BB962C8B-B14F-4D97-AF65-F5344CB8AC3E}">
-        <p14:creationId xmlns:p14="http://schemas.microsoft.com/office/powerpoint/2010/main" val="1078416497"/>
+        <p14:creationId xmlns:p14="http://schemas.microsoft.com/office/powerpoint/2010/main" val="3554447020"/>
       </p:ext>
     </p:extLst>
   </p:cSld>
@@ -6343,8 +6342,8 @@
         </p:nvSpPr>
         <p:spPr>
           <a:xfrm>
-            <a:off x="1045580" y="198388"/>
-            <a:ext cx="10364451" cy="707775"/>
+            <a:off x="938488" y="247816"/>
+            <a:ext cx="10364451" cy="658348"/>
           </a:xfrm>
         </p:spPr>
         <p:txBody>
@@ -6353,11 +6352,11 @@
           <a:p>
             <a:r>
               <a:rPr lang="en-US" dirty="0" smtClean="0"/>
-              <a:t>Box</a:t>
+              <a:t>CSS </a:t>
             </a:r>
             <a:r>
               <a:rPr lang="bg-BG" dirty="0" smtClean="0"/>
-              <a:t> модел</a:t>
+              <a:t>Цветове Демо</a:t>
             </a:r>
             <a:endParaRPr lang="en-US" dirty="0"/>
           </a:p>
@@ -6365,7 +6364,7 @@
       </p:sp>
       <p:pic>
         <p:nvPicPr>
-          <p:cNvPr id="2050" name="Picture 2" descr="http://guistuff.com/css/images/boxmodel.png"/>
+          <p:cNvPr id="1026" name="Picture 2" descr="http://www.gavick.com/documentation/wp-content/uploads/2013/09/colors-table.png"/>
           <p:cNvPicPr>
             <a:picLocks noChangeAspect="1" noChangeArrowheads="1"/>
           </p:cNvPicPr>
@@ -6386,8 +6385,8 @@
         </p:blipFill>
         <p:spPr bwMode="auto">
           <a:xfrm>
-            <a:off x="1587713" y="1275580"/>
-            <a:ext cx="9280183" cy="5209929"/>
+            <a:off x="629509" y="1882646"/>
+            <a:ext cx="10982407" cy="4180402"/>
           </a:xfrm>
           <a:prstGeom prst="rect">
             <a:avLst/>
@@ -6407,7 +6406,7 @@
     </p:spTree>
     <p:extLst>
       <p:ext uri="{BB962C8B-B14F-4D97-AF65-F5344CB8AC3E}">
-        <p14:creationId xmlns:p14="http://schemas.microsoft.com/office/powerpoint/2010/main" val="3026991479"/>
+        <p14:creationId xmlns:p14="http://schemas.microsoft.com/office/powerpoint/2010/main" val="1078416497"/>
       </p:ext>
     </p:extLst>
   </p:cSld>
@@ -6444,6 +6443,109 @@
             <p:ph type="title"/>
           </p:nvPr>
         </p:nvSpPr>
+        <p:spPr>
+          <a:xfrm>
+            <a:off x="1045580" y="198388"/>
+            <a:ext cx="10364451" cy="707775"/>
+          </a:xfrm>
+        </p:spPr>
+        <p:txBody>
+          <a:bodyPr/>
+          <a:lstStyle/>
+          <a:p>
+            <a:r>
+              <a:rPr lang="en-US" dirty="0" smtClean="0"/>
+              <a:t>Box</a:t>
+            </a:r>
+            <a:r>
+              <a:rPr lang="bg-BG" dirty="0" smtClean="0"/>
+              <a:t> модел</a:t>
+            </a:r>
+            <a:endParaRPr lang="en-US" dirty="0"/>
+          </a:p>
+        </p:txBody>
+      </p:sp>
+      <p:pic>
+        <p:nvPicPr>
+          <p:cNvPr id="2050" name="Picture 2" descr="http://guistuff.com/css/images/boxmodel.png"/>
+          <p:cNvPicPr>
+            <a:picLocks noChangeAspect="1" noChangeArrowheads="1"/>
+          </p:cNvPicPr>
+          <p:nvPr/>
+        </p:nvPicPr>
+        <p:blipFill>
+          <a:blip r:embed="rId2">
+            <a:extLst>
+              <a:ext uri="{28A0092B-C50C-407E-A947-70E740481C1C}">
+                <a14:useLocalDpi xmlns:a14="http://schemas.microsoft.com/office/drawing/2010/main" val="0"/>
+              </a:ext>
+            </a:extLst>
+          </a:blip>
+          <a:srcRect/>
+          <a:stretch>
+            <a:fillRect/>
+          </a:stretch>
+        </p:blipFill>
+        <p:spPr bwMode="auto">
+          <a:xfrm>
+            <a:off x="1587713" y="1275580"/>
+            <a:ext cx="9280183" cy="5209929"/>
+          </a:xfrm>
+          <a:prstGeom prst="rect">
+            <a:avLst/>
+          </a:prstGeom>
+          <a:noFill/>
+          <a:extLst>
+            <a:ext uri="{909E8E84-426E-40DD-AFC4-6F175D3DCCD1}">
+              <a14:hiddenFill xmlns:a14="http://schemas.microsoft.com/office/drawing/2010/main">
+                <a:solidFill>
+                  <a:srgbClr val="FFFFFF"/>
+                </a:solidFill>
+              </a14:hiddenFill>
+            </a:ext>
+          </a:extLst>
+        </p:spPr>
+      </p:pic>
+    </p:spTree>
+    <p:extLst>
+      <p:ext uri="{BB962C8B-B14F-4D97-AF65-F5344CB8AC3E}">
+        <p14:creationId xmlns:p14="http://schemas.microsoft.com/office/powerpoint/2010/main" val="3026991479"/>
+      </p:ext>
+    </p:extLst>
+  </p:cSld>
+  <p:clrMapOvr>
+    <a:masterClrMapping/>
+  </p:clrMapOvr>
+</p:sld>
+</file>
+
+<file path=ppt/slides/slide13.xml><?xml version="1.0" encoding="utf-8"?>
+<p:sld xmlns:a="http://schemas.openxmlformats.org/drawingml/2006/main" xmlns:r="http://schemas.openxmlformats.org/officeDocument/2006/relationships" xmlns:p="http://schemas.openxmlformats.org/presentationml/2006/main">
+  <p:cSld>
+    <p:spTree>
+      <p:nvGrpSpPr>
+        <p:cNvPr id="1" name=""/>
+        <p:cNvGrpSpPr/>
+        <p:nvPr/>
+      </p:nvGrpSpPr>
+      <p:grpSpPr>
+        <a:xfrm>
+          <a:off x="0" y="0"/>
+          <a:ext cx="0" cy="0"/>
+          <a:chOff x="0" y="0"/>
+          <a:chExt cx="0" cy="0"/>
+        </a:xfrm>
+      </p:grpSpPr>
+      <p:sp>
+        <p:nvSpPr>
+          <p:cNvPr id="2" name="Title 1"/>
+          <p:cNvSpPr>
+            <a:spLocks noGrp="1"/>
+          </p:cNvSpPr>
+          <p:nvPr>
+            <p:ph type="title"/>
+          </p:nvPr>
+        </p:nvSpPr>
         <p:spPr/>
         <p:txBody>
           <a:bodyPr/>
@@ -6505,6 +6607,599 @@
     <p:extLst>
       <p:ext uri="{BB962C8B-B14F-4D97-AF65-F5344CB8AC3E}">
         <p14:creationId xmlns:p14="http://schemas.microsoft.com/office/powerpoint/2010/main" val="942149458"/>
+      </p:ext>
+    </p:extLst>
+  </p:cSld>
+  <p:clrMapOvr>
+    <a:masterClrMapping/>
+  </p:clrMapOvr>
+</p:sld>
+</file>
+
+<file path=ppt/slides/slide14.xml><?xml version="1.0" encoding="utf-8"?>
+<p:sld xmlns:a="http://schemas.openxmlformats.org/drawingml/2006/main" xmlns:r="http://schemas.openxmlformats.org/officeDocument/2006/relationships" xmlns:p="http://schemas.openxmlformats.org/presentationml/2006/main">
+  <p:cSld>
+    <p:spTree>
+      <p:nvGrpSpPr>
+        <p:cNvPr id="1" name=""/>
+        <p:cNvGrpSpPr/>
+        <p:nvPr/>
+      </p:nvGrpSpPr>
+      <p:grpSpPr>
+        <a:xfrm>
+          <a:off x="0" y="0"/>
+          <a:ext cx="0" cy="0"/>
+          <a:chOff x="0" y="0"/>
+          <a:chExt cx="0" cy="0"/>
+        </a:xfrm>
+      </p:grpSpPr>
+      <p:sp>
+        <p:nvSpPr>
+          <p:cNvPr id="2" name="Title 1"/>
+          <p:cNvSpPr>
+            <a:spLocks noGrp="1"/>
+          </p:cNvSpPr>
+          <p:nvPr>
+            <p:ph type="title"/>
+          </p:nvPr>
+        </p:nvSpPr>
+        <p:spPr/>
+        <p:txBody>
+          <a:bodyPr/>
+          <a:lstStyle/>
+          <a:p>
+            <a:r>
+              <a:rPr lang="en-US" dirty="0" smtClean="0"/>
+              <a:t>CSS </a:t>
+            </a:r>
+            <a:r>
+              <a:rPr lang="bg-BG" dirty="0" smtClean="0"/>
+              <a:t>Размери Демо</a:t>
+            </a:r>
+            <a:endParaRPr lang="en-US" dirty="0"/>
+          </a:p>
+        </p:txBody>
+      </p:sp>
+      <p:pic>
+        <p:nvPicPr>
+          <p:cNvPr id="1026" name="Picture 2" descr="http://www.livetechz.com/wp-content/uploads/2013/11/Advantage-of-em-unit-in-font-size.gif"/>
+          <p:cNvPicPr>
+            <a:picLocks noChangeAspect="1" noChangeArrowheads="1"/>
+          </p:cNvPicPr>
+          <p:nvPr/>
+        </p:nvPicPr>
+        <p:blipFill>
+          <a:blip r:embed="rId2">
+            <a:extLst>
+              <a:ext uri="{28A0092B-C50C-407E-A947-70E740481C1C}">
+                <a14:useLocalDpi xmlns:a14="http://schemas.microsoft.com/office/drawing/2010/main" val="0"/>
+              </a:ext>
+            </a:extLst>
+          </a:blip>
+          <a:srcRect/>
+          <a:stretch>
+            <a:fillRect/>
+          </a:stretch>
+        </p:blipFill>
+        <p:spPr bwMode="auto">
+          <a:xfrm>
+            <a:off x="1906588" y="2132698"/>
+            <a:ext cx="8378824" cy="4080395"/>
+          </a:xfrm>
+          <a:prstGeom prst="rect">
+            <a:avLst/>
+          </a:prstGeom>
+          <a:noFill/>
+          <a:extLst>
+            <a:ext uri="{909E8E84-426E-40DD-AFC4-6F175D3DCCD1}">
+              <a14:hiddenFill xmlns:a14="http://schemas.microsoft.com/office/drawing/2010/main">
+                <a:solidFill>
+                  <a:srgbClr val="FFFFFF"/>
+                </a:solidFill>
+              </a14:hiddenFill>
+            </a:ext>
+          </a:extLst>
+        </p:spPr>
+      </p:pic>
+    </p:spTree>
+    <p:extLst>
+      <p:ext uri="{BB962C8B-B14F-4D97-AF65-F5344CB8AC3E}">
+        <p14:creationId xmlns:p14="http://schemas.microsoft.com/office/powerpoint/2010/main" val="2551920435"/>
+      </p:ext>
+    </p:extLst>
+  </p:cSld>
+  <p:clrMapOvr>
+    <a:masterClrMapping/>
+  </p:clrMapOvr>
+</p:sld>
+</file>
+
+<file path=ppt/slides/slide15.xml><?xml version="1.0" encoding="utf-8"?>
+<p:sld xmlns:a="http://schemas.openxmlformats.org/drawingml/2006/main" xmlns:r="http://schemas.openxmlformats.org/officeDocument/2006/relationships" xmlns:p="http://schemas.openxmlformats.org/presentationml/2006/main">
+  <p:cSld>
+    <p:spTree>
+      <p:nvGrpSpPr>
+        <p:cNvPr id="1" name=""/>
+        <p:cNvGrpSpPr/>
+        <p:nvPr/>
+      </p:nvGrpSpPr>
+      <p:grpSpPr>
+        <a:xfrm>
+          <a:off x="0" y="0"/>
+          <a:ext cx="0" cy="0"/>
+          <a:chOff x="0" y="0"/>
+          <a:chExt cx="0" cy="0"/>
+        </a:xfrm>
+      </p:grpSpPr>
+      <p:sp>
+        <p:nvSpPr>
+          <p:cNvPr id="2" name="Title 1"/>
+          <p:cNvSpPr>
+            <a:spLocks noGrp="1"/>
+          </p:cNvSpPr>
+          <p:nvPr>
+            <p:ph type="title"/>
+          </p:nvPr>
+        </p:nvSpPr>
+        <p:spPr/>
+        <p:txBody>
+          <a:bodyPr/>
+          <a:lstStyle/>
+          <a:p>
+            <a:r>
+              <a:rPr lang="en-US" dirty="0" smtClean="0"/>
+              <a:t>CSS </a:t>
+            </a:r>
+            <a:r>
+              <a:rPr lang="bg-BG" dirty="0" smtClean="0"/>
+              <a:t>за стилизиране на текст</a:t>
+            </a:r>
+            <a:endParaRPr lang="en-US" dirty="0"/>
+          </a:p>
+        </p:txBody>
+      </p:sp>
+      <p:sp>
+        <p:nvSpPr>
+          <p:cNvPr id="3" name="Content Placeholder 2"/>
+          <p:cNvSpPr>
+            <a:spLocks noGrp="1"/>
+          </p:cNvSpPr>
+          <p:nvPr>
+            <p:ph sz="quarter" idx="13"/>
+          </p:nvPr>
+        </p:nvSpPr>
+        <p:spPr/>
+        <p:txBody>
+          <a:bodyPr/>
+          <a:lstStyle/>
+          <a:p>
+            <a:r>
+              <a:rPr lang="en-US" dirty="0" smtClean="0"/>
+              <a:t>Font-size – </a:t>
+            </a:r>
+            <a:r>
+              <a:rPr lang="bg-BG" dirty="0" smtClean="0"/>
+              <a:t>определя размера на шрифта</a:t>
+            </a:r>
+          </a:p>
+          <a:p>
+            <a:r>
+              <a:rPr lang="en-US" dirty="0" smtClean="0"/>
+              <a:t>Font-family – </a:t>
+            </a:r>
+            <a:r>
+              <a:rPr lang="bg-BG" dirty="0" smtClean="0"/>
+              <a:t>определя кой точно шрифт да използваме</a:t>
+            </a:r>
+            <a:endParaRPr lang="en-US" dirty="0" smtClean="0"/>
+          </a:p>
+          <a:p>
+            <a:r>
+              <a:rPr lang="en-US" dirty="0" smtClean="0"/>
+              <a:t>Font-weight –</a:t>
+            </a:r>
+            <a:r>
+              <a:rPr lang="bg-BG" dirty="0" smtClean="0"/>
+              <a:t> определя дебелината на шрифта</a:t>
+            </a:r>
+          </a:p>
+          <a:p>
+            <a:r>
+              <a:rPr lang="en-US" dirty="0" smtClean="0"/>
+              <a:t>Font-style – </a:t>
+            </a:r>
+            <a:r>
+              <a:rPr lang="bg-BG" dirty="0" smtClean="0"/>
+              <a:t>определя дали текста да е наклонен</a:t>
+            </a:r>
+          </a:p>
+          <a:p>
+            <a:r>
+              <a:rPr lang="en-US" dirty="0" smtClean="0"/>
+              <a:t>Text-decoration – </a:t>
+            </a:r>
+            <a:r>
+              <a:rPr lang="bg-BG" dirty="0" smtClean="0"/>
+              <a:t>определя дали текста е подчертан</a:t>
+            </a:r>
+          </a:p>
+          <a:p>
+            <a:r>
+              <a:rPr lang="en-US" dirty="0" smtClean="0"/>
+              <a:t>Text-align – </a:t>
+            </a:r>
+            <a:r>
+              <a:rPr lang="bg-BG" dirty="0" smtClean="0"/>
+              <a:t>определя подравняването на текста</a:t>
+            </a:r>
+            <a:endParaRPr lang="en-US" dirty="0"/>
+          </a:p>
+        </p:txBody>
+      </p:sp>
+    </p:spTree>
+    <p:extLst>
+      <p:ext uri="{BB962C8B-B14F-4D97-AF65-F5344CB8AC3E}">
+        <p14:creationId xmlns:p14="http://schemas.microsoft.com/office/powerpoint/2010/main" val="2426249351"/>
+      </p:ext>
+    </p:extLst>
+  </p:cSld>
+  <p:clrMapOvr>
+    <a:masterClrMapping/>
+  </p:clrMapOvr>
+</p:sld>
+</file>
+
+<file path=ppt/slides/slide16.xml><?xml version="1.0" encoding="utf-8"?>
+<p:sld xmlns:a="http://schemas.openxmlformats.org/drawingml/2006/main" xmlns:r="http://schemas.openxmlformats.org/officeDocument/2006/relationships" xmlns:p="http://schemas.openxmlformats.org/presentationml/2006/main">
+  <p:cSld>
+    <p:spTree>
+      <p:nvGrpSpPr>
+        <p:cNvPr id="1" name=""/>
+        <p:cNvGrpSpPr/>
+        <p:nvPr/>
+      </p:nvGrpSpPr>
+      <p:grpSpPr>
+        <a:xfrm>
+          <a:off x="0" y="0"/>
+          <a:ext cx="0" cy="0"/>
+          <a:chOff x="0" y="0"/>
+          <a:chExt cx="0" cy="0"/>
+        </a:xfrm>
+      </p:grpSpPr>
+      <p:sp>
+        <p:nvSpPr>
+          <p:cNvPr id="2" name="Title 1"/>
+          <p:cNvSpPr>
+            <a:spLocks noGrp="1"/>
+          </p:cNvSpPr>
+          <p:nvPr>
+            <p:ph type="title"/>
+          </p:nvPr>
+        </p:nvSpPr>
+        <p:spPr>
+          <a:xfrm>
+            <a:off x="913773" y="66583"/>
+            <a:ext cx="10364451" cy="788452"/>
+          </a:xfrm>
+        </p:spPr>
+        <p:txBody>
+          <a:bodyPr/>
+          <a:lstStyle/>
+          <a:p>
+            <a:r>
+              <a:rPr lang="en-US" dirty="0" smtClean="0"/>
+              <a:t>CSS </a:t>
+            </a:r>
+            <a:r>
+              <a:rPr lang="bg-BG" dirty="0" smtClean="0"/>
+              <a:t>оформяне на текст </a:t>
+            </a:r>
+            <a:r>
+              <a:rPr lang="bg-BG" dirty="0" err="1" smtClean="0"/>
+              <a:t>ДЕмо</a:t>
+            </a:r>
+            <a:endParaRPr lang="en-US" dirty="0"/>
+          </a:p>
+        </p:txBody>
+      </p:sp>
+      <p:pic>
+        <p:nvPicPr>
+          <p:cNvPr id="2050" name="Picture 2" descr="https://softuni.bg/files/images/css.jpg"/>
+          <p:cNvPicPr>
+            <a:picLocks noChangeAspect="1" noChangeArrowheads="1"/>
+          </p:cNvPicPr>
+          <p:nvPr/>
+        </p:nvPicPr>
+        <p:blipFill>
+          <a:blip r:embed="rId2" cstate="print">
+            <a:extLst>
+              <a:ext uri="{28A0092B-C50C-407E-A947-70E740481C1C}">
+                <a14:useLocalDpi xmlns:a14="http://schemas.microsoft.com/office/drawing/2010/main" val="0"/>
+              </a:ext>
+            </a:extLst>
+          </a:blip>
+          <a:srcRect/>
+          <a:stretch>
+            <a:fillRect/>
+          </a:stretch>
+        </p:blipFill>
+        <p:spPr bwMode="auto">
+          <a:xfrm>
+            <a:off x="2461977" y="1069218"/>
+            <a:ext cx="7268041" cy="5451031"/>
+          </a:xfrm>
+          <a:prstGeom prst="rect">
+            <a:avLst/>
+          </a:prstGeom>
+          <a:noFill/>
+          <a:extLst>
+            <a:ext uri="{909E8E84-426E-40DD-AFC4-6F175D3DCCD1}">
+              <a14:hiddenFill xmlns:a14="http://schemas.microsoft.com/office/drawing/2010/main">
+                <a:solidFill>
+                  <a:srgbClr val="FFFFFF"/>
+                </a:solidFill>
+              </a14:hiddenFill>
+            </a:ext>
+          </a:extLst>
+        </p:spPr>
+      </p:pic>
+    </p:spTree>
+    <p:extLst>
+      <p:ext uri="{BB962C8B-B14F-4D97-AF65-F5344CB8AC3E}">
+        <p14:creationId xmlns:p14="http://schemas.microsoft.com/office/powerpoint/2010/main" val="1062329732"/>
+      </p:ext>
+    </p:extLst>
+  </p:cSld>
+  <p:clrMapOvr>
+    <a:masterClrMapping/>
+  </p:clrMapOvr>
+</p:sld>
+</file>
+
+<file path=ppt/slides/slide17.xml><?xml version="1.0" encoding="utf-8"?>
+<p:sld xmlns:a="http://schemas.openxmlformats.org/drawingml/2006/main" xmlns:r="http://schemas.openxmlformats.org/officeDocument/2006/relationships" xmlns:p="http://schemas.openxmlformats.org/presentationml/2006/main">
+  <p:cSld>
+    <p:spTree>
+      <p:nvGrpSpPr>
+        <p:cNvPr id="1" name=""/>
+        <p:cNvGrpSpPr/>
+        <p:nvPr/>
+      </p:nvGrpSpPr>
+      <p:grpSpPr>
+        <a:xfrm>
+          <a:off x="0" y="0"/>
+          <a:ext cx="0" cy="0"/>
+          <a:chOff x="0" y="0"/>
+          <a:chExt cx="0" cy="0"/>
+        </a:xfrm>
+      </p:grpSpPr>
+      <p:sp>
+        <p:nvSpPr>
+          <p:cNvPr id="2" name="Title 1"/>
+          <p:cNvSpPr>
+            <a:spLocks noGrp="1"/>
+          </p:cNvSpPr>
+          <p:nvPr>
+            <p:ph type="title"/>
+          </p:nvPr>
+        </p:nvSpPr>
+        <p:spPr/>
+        <p:txBody>
+          <a:bodyPr/>
+          <a:lstStyle/>
+          <a:p>
+            <a:r>
+              <a:rPr lang="en-US" dirty="0" err="1" smtClean="0"/>
+              <a:t>Css</a:t>
+            </a:r>
+            <a:r>
+              <a:rPr lang="bg-BG" dirty="0" smtClean="0"/>
+              <a:t> за фон</a:t>
+            </a:r>
+            <a:endParaRPr lang="en-US" dirty="0"/>
+          </a:p>
+        </p:txBody>
+      </p:sp>
+      <p:sp>
+        <p:nvSpPr>
+          <p:cNvPr id="3" name="Content Placeholder 2"/>
+          <p:cNvSpPr>
+            <a:spLocks noGrp="1"/>
+          </p:cNvSpPr>
+          <p:nvPr>
+            <p:ph sz="quarter" idx="13"/>
+          </p:nvPr>
+        </p:nvSpPr>
+        <p:spPr>
+          <a:xfrm>
+            <a:off x="913774" y="2034746"/>
+            <a:ext cx="10363826" cy="3756453"/>
+          </a:xfrm>
+        </p:spPr>
+        <p:txBody>
+          <a:bodyPr>
+            <a:normAutofit/>
+          </a:bodyPr>
+          <a:lstStyle/>
+          <a:p>
+            <a:r>
+              <a:rPr lang="en-US" dirty="0" smtClean="0"/>
+              <a:t>Background-image: </a:t>
+            </a:r>
+            <a:r>
+              <a:rPr lang="bg-BG" dirty="0" smtClean="0"/>
+              <a:t>използва се картинка като фон</a:t>
+            </a:r>
+          </a:p>
+          <a:p>
+            <a:r>
+              <a:rPr lang="bg-BG" dirty="0" smtClean="0"/>
+              <a:t> </a:t>
+            </a:r>
+            <a:r>
+              <a:rPr lang="en-US" dirty="0" smtClean="0"/>
+              <a:t>background-color: </a:t>
+            </a:r>
+            <a:r>
+              <a:rPr lang="bg-BG" dirty="0" smtClean="0"/>
+              <a:t>използва се цвят като фон</a:t>
+            </a:r>
+          </a:p>
+          <a:p>
+            <a:r>
+              <a:rPr lang="en-US" dirty="0" smtClean="0"/>
+              <a:t>background-repeat: </a:t>
+            </a:r>
+            <a:r>
+              <a:rPr lang="bg-BG" dirty="0" smtClean="0"/>
+              <a:t>как да се повтаря фонът по дължина и по ширина</a:t>
+            </a:r>
+          </a:p>
+          <a:p>
+            <a:r>
+              <a:rPr lang="en-US" dirty="0" smtClean="0"/>
+              <a:t>Background-attachment: </a:t>
+            </a:r>
+            <a:r>
+              <a:rPr lang="bg-BG" dirty="0" smtClean="0"/>
+              <a:t>как да се държи фонът при движение с мишката </a:t>
+            </a:r>
+            <a:r>
+              <a:rPr lang="en-US" dirty="0" smtClean="0"/>
+              <a:t>(scroll)</a:t>
+            </a:r>
+          </a:p>
+          <a:p>
+            <a:r>
+              <a:rPr lang="en-US" dirty="0" smtClean="0"/>
+              <a:t>background-position: </a:t>
+            </a:r>
+            <a:r>
+              <a:rPr lang="bg-BG" dirty="0" smtClean="0"/>
+              <a:t>от къде да започва фонът</a:t>
+            </a:r>
+          </a:p>
+          <a:p>
+            <a:r>
+              <a:rPr lang="bg-BG" dirty="0" smtClean="0"/>
+              <a:t>Съкратен синтаксис за фон: </a:t>
+            </a:r>
+            <a:r>
+              <a:rPr lang="en-US" sz="1600" noProof="1"/>
+              <a:t>background: #FFF0C0 url("back.gif") no-repeat fixed top;</a:t>
+            </a:r>
+            <a:endParaRPr lang="en-US" noProof="1"/>
+          </a:p>
+          <a:p>
+            <a:endParaRPr lang="en-US" dirty="0"/>
+          </a:p>
+          <a:p>
+            <a:endParaRPr lang="en-US" dirty="0"/>
+          </a:p>
+        </p:txBody>
+      </p:sp>
+    </p:spTree>
+    <p:extLst>
+      <p:ext uri="{BB962C8B-B14F-4D97-AF65-F5344CB8AC3E}">
+        <p14:creationId xmlns:p14="http://schemas.microsoft.com/office/powerpoint/2010/main" val="1622788172"/>
+      </p:ext>
+    </p:extLst>
+  </p:cSld>
+  <p:clrMapOvr>
+    <a:masterClrMapping/>
+  </p:clrMapOvr>
+</p:sld>
+</file>
+
+<file path=ppt/slides/slide18.xml><?xml version="1.0" encoding="utf-8"?>
+<p:sld xmlns:a="http://schemas.openxmlformats.org/drawingml/2006/main" xmlns:r="http://schemas.openxmlformats.org/officeDocument/2006/relationships" xmlns:p="http://schemas.openxmlformats.org/presentationml/2006/main">
+  <p:cSld>
+    <p:spTree>
+      <p:nvGrpSpPr>
+        <p:cNvPr id="1" name=""/>
+        <p:cNvGrpSpPr/>
+        <p:nvPr/>
+      </p:nvGrpSpPr>
+      <p:grpSpPr>
+        <a:xfrm>
+          <a:off x="0" y="0"/>
+          <a:ext cx="0" cy="0"/>
+          <a:chOff x="0" y="0"/>
+          <a:chExt cx="0" cy="0"/>
+        </a:xfrm>
+      </p:grpSpPr>
+      <p:sp>
+        <p:nvSpPr>
+          <p:cNvPr id="2" name="Title 1"/>
+          <p:cNvSpPr>
+            <a:spLocks noGrp="1"/>
+          </p:cNvSpPr>
+          <p:nvPr>
+            <p:ph type="title"/>
+          </p:nvPr>
+        </p:nvSpPr>
+        <p:spPr/>
+        <p:txBody>
+          <a:bodyPr/>
+          <a:lstStyle/>
+          <a:p>
+            <a:r>
+              <a:rPr lang="en-US" dirty="0" smtClean="0"/>
+              <a:t>CSS </a:t>
+            </a:r>
+            <a:r>
+              <a:rPr lang="bg-BG" dirty="0" smtClean="0"/>
+              <a:t>за фон демо</a:t>
+            </a:r>
+            <a:endParaRPr lang="en-US" dirty="0"/>
+          </a:p>
+        </p:txBody>
+      </p:sp>
+      <p:pic>
+        <p:nvPicPr>
+          <p:cNvPr id="3074" name="Picture 2" descr="http://1.bp.blogspot.com/-Emfhy_ZZaec/UoN6rcCjM2I/AAAAAAAABJs/ylADIkW6v54/s600/Basic+CSS+Tutorial+Create+Multiple+Background+Images+For+Website.jpg"/>
+          <p:cNvPicPr>
+            <a:picLocks noChangeAspect="1" noChangeArrowheads="1"/>
+          </p:cNvPicPr>
+          <p:nvPr/>
+        </p:nvPicPr>
+        <p:blipFill>
+          <a:blip r:embed="rId2">
+            <a:extLst>
+              <a:ext uri="{28A0092B-C50C-407E-A947-70E740481C1C}">
+                <a14:useLocalDpi xmlns:a14="http://schemas.microsoft.com/office/drawing/2010/main" val="0"/>
+              </a:ext>
+            </a:extLst>
+          </a:blip>
+          <a:srcRect/>
+          <a:stretch>
+            <a:fillRect/>
+          </a:stretch>
+        </p:blipFill>
+        <p:spPr bwMode="auto">
+          <a:xfrm>
+            <a:off x="2598725" y="2157029"/>
+            <a:ext cx="6994549" cy="4371593"/>
+          </a:xfrm>
+          <a:prstGeom prst="rect">
+            <a:avLst/>
+          </a:prstGeom>
+          <a:noFill/>
+          <a:extLst>
+            <a:ext uri="{909E8E84-426E-40DD-AFC4-6F175D3DCCD1}">
+              <a14:hiddenFill xmlns:a14="http://schemas.microsoft.com/office/drawing/2010/main">
+                <a:solidFill>
+                  <a:srgbClr val="FFFFFF"/>
+                </a:solidFill>
+              </a14:hiddenFill>
+            </a:ext>
+          </a:extLst>
+        </p:spPr>
+      </p:pic>
+    </p:spTree>
+    <p:extLst>
+      <p:ext uri="{BB962C8B-B14F-4D97-AF65-F5344CB8AC3E}">
+        <p14:creationId xmlns:p14="http://schemas.microsoft.com/office/powerpoint/2010/main" val="609108875"/>
       </p:ext>
     </p:extLst>
   </p:cSld>
@@ -6780,7 +7475,12 @@
             <p:ph type="title"/>
           </p:nvPr>
         </p:nvSpPr>
-        <p:spPr/>
+        <p:spPr>
+          <a:xfrm>
+            <a:off x="954965" y="0"/>
+            <a:ext cx="10364451" cy="732488"/>
+          </a:xfrm>
+        </p:spPr>
         <p:txBody>
           <a:bodyPr/>
           <a:lstStyle/>
@@ -6791,93 +7491,57 @@
             </a:r>
             <a:r>
               <a:rPr lang="bg-BG" dirty="0" smtClean="0"/>
-              <a:t>Селектори</a:t>
+              <a:t>начин на използване демо</a:t>
             </a:r>
             <a:endParaRPr lang="en-US" dirty="0"/>
           </a:p>
         </p:txBody>
       </p:sp>
-      <p:sp>
-        <p:nvSpPr>
-          <p:cNvPr id="3" name="Content Placeholder 2"/>
-          <p:cNvSpPr>
-            <a:spLocks noGrp="1"/>
-          </p:cNvSpPr>
-          <p:nvPr>
-            <p:ph sz="quarter" idx="13"/>
-          </p:nvPr>
-        </p:nvSpPr>
-        <p:spPr/>
-        <p:txBody>
-          <a:bodyPr/>
-          <a:lstStyle/>
-          <a:p>
-            <a:r>
-              <a:rPr lang="bg-BG" dirty="0" smtClean="0"/>
-              <a:t>Начин по който </a:t>
-            </a:r>
-            <a:r>
-              <a:rPr lang="en-US" dirty="0" smtClean="0"/>
-              <a:t>html </a:t>
-            </a:r>
-            <a:r>
-              <a:rPr lang="bg-BG" dirty="0" smtClean="0"/>
-              <a:t>и </a:t>
-            </a:r>
-            <a:r>
-              <a:rPr lang="en-US" dirty="0" smtClean="0"/>
-              <a:t>CSS </a:t>
-            </a:r>
-            <a:r>
-              <a:rPr lang="bg-BG" dirty="0" smtClean="0"/>
-              <a:t>работят заедно</a:t>
-            </a:r>
-          </a:p>
-          <a:p>
-            <a:r>
-              <a:rPr lang="bg-BG" dirty="0" smtClean="0"/>
-              <a:t>Определят върху кой точно елемент да се приложи стилът</a:t>
-            </a:r>
-          </a:p>
-          <a:p>
-            <a:r>
-              <a:rPr lang="en-US" dirty="0" smtClean="0"/>
-              <a:t>tag</a:t>
-            </a:r>
-            <a:r>
-              <a:rPr lang="bg-BG" dirty="0" smtClean="0"/>
-              <a:t> селектор</a:t>
-            </a:r>
-          </a:p>
-          <a:p>
-            <a:r>
-              <a:rPr lang="en-US" dirty="0" smtClean="0"/>
-              <a:t>Id </a:t>
-            </a:r>
-            <a:r>
-              <a:rPr lang="bg-BG" dirty="0" smtClean="0"/>
-              <a:t>селектор</a:t>
-            </a:r>
-          </a:p>
-          <a:p>
-            <a:r>
-              <a:rPr lang="en-US" dirty="0" smtClean="0"/>
-              <a:t>Class </a:t>
-            </a:r>
-            <a:r>
-              <a:rPr lang="bg-BG" dirty="0" smtClean="0"/>
-              <a:t>селектор</a:t>
-            </a:r>
-          </a:p>
-          <a:p>
-            <a:endParaRPr lang="en-US" dirty="0"/>
-          </a:p>
-        </p:txBody>
-      </p:sp>
+      <p:pic>
+        <p:nvPicPr>
+          <p:cNvPr id="4098" name="Picture 2" descr="https://cdn0.iconfinder.com/data/icons/line-file-type-icons/100/file_code-512.png"/>
+          <p:cNvPicPr>
+            <a:picLocks noChangeAspect="1" noChangeArrowheads="1"/>
+          </p:cNvPicPr>
+          <p:nvPr/>
+        </p:nvPicPr>
+        <p:blipFill>
+          <a:blip r:embed="rId2">
+            <a:extLst>
+              <a:ext uri="{28A0092B-C50C-407E-A947-70E740481C1C}">
+                <a14:useLocalDpi xmlns:a14="http://schemas.microsoft.com/office/drawing/2010/main" val="0"/>
+              </a:ext>
+            </a:extLst>
+          </a:blip>
+          <a:srcRect/>
+          <a:stretch>
+            <a:fillRect/>
+          </a:stretch>
+        </p:blipFill>
+        <p:spPr bwMode="auto">
+          <a:xfrm>
+            <a:off x="3298782" y="1181184"/>
+            <a:ext cx="5676815" cy="5676816"/>
+          </a:xfrm>
+          <a:prstGeom prst="rect">
+            <a:avLst/>
+          </a:prstGeom>
+          <a:noFill/>
+          <a:extLst>
+            <a:ext uri="{909E8E84-426E-40DD-AFC4-6F175D3DCCD1}">
+              <a14:hiddenFill xmlns:a14="http://schemas.microsoft.com/office/drawing/2010/main">
+                <a:solidFill>
+                  <a:srgbClr val="FFFFFF"/>
+                </a:solidFill>
+              </a14:hiddenFill>
+            </a:ext>
+          </a:extLst>
+        </p:spPr>
+      </p:pic>
     </p:spTree>
     <p:extLst>
       <p:ext uri="{BB962C8B-B14F-4D97-AF65-F5344CB8AC3E}">
-        <p14:creationId xmlns:p14="http://schemas.microsoft.com/office/powerpoint/2010/main" val="1044553464"/>
+        <p14:creationId xmlns:p14="http://schemas.microsoft.com/office/powerpoint/2010/main" val="3084916368"/>
       </p:ext>
     </p:extLst>
   </p:cSld>
@@ -6914,81 +7578,104 @@
             <p:ph type="title"/>
           </p:nvPr>
         </p:nvSpPr>
-        <p:spPr>
-          <a:xfrm>
-            <a:off x="913772" y="378941"/>
-            <a:ext cx="10364451" cy="823105"/>
-          </a:xfrm>
-        </p:spPr>
-        <p:txBody>
-          <a:bodyPr/>
-          <a:lstStyle/>
-          <a:p>
-            <a:r>
-              <a:rPr lang="en-US" dirty="0"/>
+        <p:spPr/>
+        <p:txBody>
+          <a:bodyPr/>
+          <a:lstStyle/>
+          <a:p>
+            <a:r>
+              <a:rPr lang="en-US" dirty="0" smtClean="0"/>
               <a:t>CSS </a:t>
             </a:r>
             <a:r>
               <a:rPr lang="bg-BG" dirty="0" smtClean="0"/>
               <a:t>Селектори</a:t>
             </a:r>
+            <a:endParaRPr lang="en-US" dirty="0"/>
+          </a:p>
+        </p:txBody>
+      </p:sp>
+      <p:sp>
+        <p:nvSpPr>
+          <p:cNvPr id="3" name="Content Placeholder 2"/>
+          <p:cNvSpPr>
+            <a:spLocks noGrp="1"/>
+          </p:cNvSpPr>
+          <p:nvPr>
+            <p:ph sz="quarter" idx="13"/>
+          </p:nvPr>
+        </p:nvSpPr>
+        <p:spPr/>
+        <p:txBody>
+          <a:bodyPr/>
+          <a:lstStyle/>
+          <a:p>
+            <a:r>
+              <a:rPr lang="bg-BG" dirty="0" smtClean="0"/>
+              <a:t>Начин по който </a:t>
+            </a:r>
             <a:r>
               <a:rPr lang="en-US" dirty="0" smtClean="0"/>
-              <a:t> </a:t>
+              <a:t>html </a:t>
             </a:r>
             <a:r>
               <a:rPr lang="bg-BG" dirty="0" smtClean="0"/>
-              <a:t>демо</a:t>
-            </a:r>
+              <a:t>и </a:t>
+            </a:r>
+            <a:r>
+              <a:rPr lang="en-US" dirty="0" smtClean="0"/>
+              <a:t>CSS </a:t>
+            </a:r>
+            <a:r>
+              <a:rPr lang="bg-BG" dirty="0" smtClean="0"/>
+              <a:t>работят заедно</a:t>
+            </a:r>
+          </a:p>
+          <a:p>
+            <a:r>
+              <a:rPr lang="bg-BG" dirty="0" smtClean="0"/>
+              <a:t>Определят върху кой точно елемент да се приложи стилът</a:t>
+            </a:r>
+          </a:p>
+          <a:p>
+            <a:r>
+              <a:rPr lang="en-US" dirty="0" smtClean="0"/>
+              <a:t>tag</a:t>
+            </a:r>
+            <a:r>
+              <a:rPr lang="bg-BG" dirty="0" smtClean="0"/>
+              <a:t> селектор</a:t>
+            </a:r>
+          </a:p>
+          <a:p>
+            <a:r>
+              <a:rPr lang="en-US" dirty="0" smtClean="0"/>
+              <a:t>Id </a:t>
+            </a:r>
+            <a:r>
+              <a:rPr lang="bg-BG" dirty="0" smtClean="0"/>
+              <a:t>селектор</a:t>
+            </a:r>
+          </a:p>
+          <a:p>
+            <a:r>
+              <a:rPr lang="en-US" dirty="0" smtClean="0"/>
+              <a:t>Class </a:t>
+            </a:r>
+            <a:r>
+              <a:rPr lang="bg-BG" dirty="0" smtClean="0"/>
+              <a:t>селектор</a:t>
+            </a:r>
+          </a:p>
+          <a:p>
             <a:endParaRPr lang="en-US" dirty="0"/>
           </a:p>
         </p:txBody>
       </p:sp>
-      <p:pic>
-        <p:nvPicPr>
-          <p:cNvPr id="1026" name="Picture 2" descr="http://blog.teamtreehouse.com/wp-content/uploads/2012/12/css.jpg"/>
-          <p:cNvPicPr>
-            <a:picLocks noChangeAspect="1" noChangeArrowheads="1"/>
-          </p:cNvPicPr>
-          <p:nvPr/>
-        </p:nvPicPr>
-        <p:blipFill>
-          <a:blip r:embed="rId2">
-            <a:extLst>
-              <a:ext uri="{28A0092B-C50C-407E-A947-70E740481C1C}">
-                <a14:useLocalDpi xmlns:a14="http://schemas.microsoft.com/office/drawing/2010/main" val="0"/>
-              </a:ext>
-            </a:extLst>
-          </a:blip>
-          <a:srcRect/>
-          <a:stretch>
-            <a:fillRect/>
-          </a:stretch>
-        </p:blipFill>
-        <p:spPr bwMode="auto">
-          <a:xfrm>
-            <a:off x="299581" y="1923533"/>
-            <a:ext cx="11592835" cy="4576119"/>
-          </a:xfrm>
-          <a:prstGeom prst="rect">
-            <a:avLst/>
-          </a:prstGeom>
-          <a:noFill/>
-          <a:extLst>
-            <a:ext uri="{909E8E84-426E-40DD-AFC4-6F175D3DCCD1}">
-              <a14:hiddenFill xmlns:a14="http://schemas.microsoft.com/office/drawing/2010/main">
-                <a:solidFill>
-                  <a:srgbClr val="FFFFFF"/>
-                </a:solidFill>
-              </a14:hiddenFill>
-            </a:ext>
-          </a:extLst>
-        </p:spPr>
-      </p:pic>
     </p:spTree>
     <p:extLst>
       <p:ext uri="{BB962C8B-B14F-4D97-AF65-F5344CB8AC3E}">
-        <p14:creationId xmlns:p14="http://schemas.microsoft.com/office/powerpoint/2010/main" val="1265045393"/>
+        <p14:creationId xmlns:p14="http://schemas.microsoft.com/office/powerpoint/2010/main" val="1044553464"/>
       </p:ext>
     </p:extLst>
   </p:cSld>
@@ -7025,18 +7712,23 @@
             <p:ph type="title"/>
           </p:nvPr>
         </p:nvSpPr>
-        <p:spPr/>
-        <p:txBody>
-          <a:bodyPr/>
-          <a:lstStyle/>
-          <a:p>
+        <p:spPr>
+          <a:xfrm>
+            <a:off x="913772" y="378941"/>
+            <a:ext cx="10364451" cy="823105"/>
+          </a:xfrm>
+        </p:spPr>
+        <p:txBody>
+          <a:bodyPr/>
+          <a:lstStyle/>
+          <a:p>
+            <a:r>
+              <a:rPr lang="en-US" dirty="0"/>
+              <a:t>CSS </a:t>
+            </a:r>
             <a:r>
               <a:rPr lang="bg-BG" dirty="0" smtClean="0"/>
-              <a:t>Други </a:t>
-            </a:r>
-            <a:r>
-              <a:rPr lang="en-US" dirty="0" err="1" smtClean="0"/>
-              <a:t>css</a:t>
+              <a:t>Селектори</a:t>
             </a:r>
             <a:r>
               <a:rPr lang="en-US" dirty="0" smtClean="0"/>
@@ -7044,190 +7736,57 @@
             </a:r>
             <a:r>
               <a:rPr lang="bg-BG" dirty="0" smtClean="0"/>
-              <a:t>селектори</a:t>
+              <a:t>демо</a:t>
             </a:r>
             <a:endParaRPr lang="en-US" dirty="0"/>
           </a:p>
         </p:txBody>
       </p:sp>
-      <p:sp>
-        <p:nvSpPr>
-          <p:cNvPr id="4" name="Content Placeholder 2"/>
-          <p:cNvSpPr>
-            <a:spLocks noGrp="1"/>
-          </p:cNvSpPr>
-          <p:nvPr>
-            <p:ph sz="quarter" idx="13"/>
-          </p:nvPr>
-        </p:nvSpPr>
-        <p:spPr>
-          <a:xfrm>
-            <a:off x="913774" y="2367092"/>
-            <a:ext cx="10363826" cy="4322032"/>
-          </a:xfrm>
-        </p:spPr>
-        <p:txBody>
-          <a:bodyPr>
-            <a:normAutofit/>
-          </a:bodyPr>
-          <a:lstStyle/>
-          <a:p>
-            <a:r>
-              <a:rPr lang="bg-BG" dirty="0" smtClean="0"/>
-              <a:t>Комбинация от </a:t>
-            </a:r>
-            <a:r>
-              <a:rPr lang="en-US" dirty="0" smtClean="0"/>
-              <a:t>tag </a:t>
-            </a:r>
-            <a:r>
-              <a:rPr lang="bg-BG" dirty="0" smtClean="0"/>
-              <a:t>и клас или от </a:t>
-            </a:r>
-            <a:r>
-              <a:rPr lang="en-US" dirty="0" smtClean="0"/>
-              <a:t>tag </a:t>
-            </a:r>
-            <a:r>
-              <a:rPr lang="bg-BG" dirty="0" smtClean="0"/>
-              <a:t>и </a:t>
-            </a:r>
-            <a:r>
-              <a:rPr lang="en-US" dirty="0" smtClean="0"/>
-              <a:t>id</a:t>
-            </a:r>
-            <a:r>
-              <a:rPr lang="bg-BG" dirty="0"/>
-              <a:t>:</a:t>
-            </a:r>
-            <a:r>
-              <a:rPr lang="bg-BG" dirty="0" smtClean="0"/>
-              <a:t> </a:t>
-            </a:r>
-            <a:r>
-              <a:rPr lang="en-US" dirty="0" smtClean="0"/>
-              <a:t>p.my-class, </a:t>
-            </a:r>
-            <a:r>
-              <a:rPr lang="en-US" dirty="0" err="1" smtClean="0"/>
-              <a:t>p#first-id</a:t>
-            </a:r>
-            <a:endParaRPr lang="en-US" dirty="0" smtClean="0"/>
-          </a:p>
-          <a:p>
-            <a:r>
-              <a:rPr lang="bg-BG" dirty="0" smtClean="0"/>
-              <a:t>Вложен селектор</a:t>
-            </a:r>
-            <a:r>
-              <a:rPr lang="bg-BG" dirty="0"/>
-              <a:t>:</a:t>
-            </a:r>
-            <a:r>
-              <a:rPr lang="en-US" dirty="0" smtClean="0"/>
-              <a:t> body div</a:t>
-            </a:r>
-          </a:p>
-          <a:p>
-            <a:r>
-              <a:rPr lang="bg-BG" dirty="0" smtClean="0"/>
-              <a:t>Селектор *</a:t>
-            </a:r>
-          </a:p>
-          <a:p>
-            <a:r>
-              <a:rPr lang="bg-BG" dirty="0" smtClean="0"/>
-              <a:t>Селектор за директни деца: </a:t>
-            </a:r>
-            <a:r>
-              <a:rPr lang="en-US" dirty="0" smtClean="0"/>
-              <a:t>div &gt; p</a:t>
-            </a:r>
-          </a:p>
-          <a:p>
-            <a:r>
-              <a:rPr lang="bg-BG" dirty="0" smtClean="0"/>
-              <a:t>Селектор за съседни елементи: </a:t>
-            </a:r>
-            <a:r>
-              <a:rPr lang="en-US" dirty="0" err="1" smtClean="0"/>
-              <a:t>img</a:t>
-            </a:r>
-            <a:r>
-              <a:rPr lang="en-US" dirty="0" smtClean="0"/>
-              <a:t> + div</a:t>
-            </a:r>
-          </a:p>
-          <a:p>
-            <a:r>
-              <a:rPr lang="bg-BG" dirty="0" smtClean="0"/>
-              <a:t>Селектор за  атрибути</a:t>
-            </a:r>
-            <a:r>
-              <a:rPr lang="en-US" dirty="0" smtClean="0"/>
-              <a:t>: </a:t>
-            </a:r>
-            <a:r>
-              <a:rPr lang="en-US" dirty="0"/>
-              <a:t>input[type="button</a:t>
-            </a:r>
-            <a:r>
-              <a:rPr lang="en-US" dirty="0" smtClean="0"/>
-              <a:t>"]</a:t>
-            </a:r>
-            <a:endParaRPr lang="bg-BG" dirty="0" smtClean="0"/>
-          </a:p>
-          <a:p>
-            <a:r>
-              <a:rPr lang="bg-BG" dirty="0" smtClean="0"/>
-              <a:t>Информация за останалите </a:t>
-            </a:r>
-            <a:r>
-              <a:rPr lang="en-US" dirty="0" err="1" smtClean="0"/>
-              <a:t>css</a:t>
-            </a:r>
-            <a:r>
-              <a:rPr lang="en-US" dirty="0" smtClean="0"/>
-              <a:t> </a:t>
-            </a:r>
-            <a:r>
-              <a:rPr lang="bg-BG" dirty="0" smtClean="0"/>
-              <a:t>селектори може да намерите тук:</a:t>
-            </a:r>
-          </a:p>
-          <a:p>
-            <a:pPr marL="0" indent="0">
-              <a:buNone/>
-            </a:pPr>
-            <a:r>
-              <a:rPr lang="en-US" dirty="0">
-                <a:hlinkClick r:id="rId2"/>
-              </a:rPr>
-              <a:t>http://</a:t>
-            </a:r>
-            <a:r>
-              <a:rPr lang="en-US" dirty="0" smtClean="0">
-                <a:hlinkClick r:id="rId2"/>
-              </a:rPr>
-              <a:t>www.w3schools.com/cssref/css_selectors.asp</a:t>
-            </a:r>
-            <a:endParaRPr lang="bg-BG" dirty="0" smtClean="0"/>
-          </a:p>
-          <a:p>
-            <a:pPr marL="0" indent="0">
-              <a:buNone/>
-            </a:pPr>
-            <a:endParaRPr lang="bg-BG" dirty="0" smtClean="0"/>
-          </a:p>
-          <a:p>
-            <a:endParaRPr lang="en-US" dirty="0"/>
-          </a:p>
-        </p:txBody>
-      </p:sp>
+      <p:pic>
+        <p:nvPicPr>
+          <p:cNvPr id="1026" name="Picture 2" descr="http://blog.teamtreehouse.com/wp-content/uploads/2012/12/css.jpg"/>
+          <p:cNvPicPr>
+            <a:picLocks noChangeAspect="1" noChangeArrowheads="1"/>
+          </p:cNvPicPr>
+          <p:nvPr/>
+        </p:nvPicPr>
+        <p:blipFill>
+          <a:blip r:embed="rId2">
+            <a:extLst>
+              <a:ext uri="{28A0092B-C50C-407E-A947-70E740481C1C}">
+                <a14:useLocalDpi xmlns:a14="http://schemas.microsoft.com/office/drawing/2010/main" val="0"/>
+              </a:ext>
+            </a:extLst>
+          </a:blip>
+          <a:srcRect/>
+          <a:stretch>
+            <a:fillRect/>
+          </a:stretch>
+        </p:blipFill>
+        <p:spPr bwMode="auto">
+          <a:xfrm>
+            <a:off x="299581" y="1923533"/>
+            <a:ext cx="11592835" cy="4576119"/>
+          </a:xfrm>
+          <a:prstGeom prst="rect">
+            <a:avLst/>
+          </a:prstGeom>
+          <a:noFill/>
+          <a:extLst>
+            <a:ext uri="{909E8E84-426E-40DD-AFC4-6F175D3DCCD1}">
+              <a14:hiddenFill xmlns:a14="http://schemas.microsoft.com/office/drawing/2010/main">
+                <a:solidFill>
+                  <a:srgbClr val="FFFFFF"/>
+                </a:solidFill>
+              </a14:hiddenFill>
+            </a:ext>
+          </a:extLst>
+        </p:spPr>
+      </p:pic>
     </p:spTree>
     <p:extLst>
       <p:ext uri="{BB962C8B-B14F-4D97-AF65-F5344CB8AC3E}">
-        <p14:creationId xmlns:p14="http://schemas.microsoft.com/office/powerpoint/2010/main" val="1981217362"/>
+        <p14:creationId xmlns:p14="http://schemas.microsoft.com/office/powerpoint/2010/main" val="1265045393"/>
       </p:ext>
     </p:extLst>
   </p:cSld>
@@ -7264,12 +7823,7 @@
             <p:ph type="title"/>
           </p:nvPr>
         </p:nvSpPr>
-        <p:spPr>
-          <a:xfrm>
-            <a:off x="946726" y="91296"/>
-            <a:ext cx="10364451" cy="724251"/>
-          </a:xfrm>
-        </p:spPr>
+        <p:spPr/>
         <p:txBody>
           <a:bodyPr/>
           <a:lstStyle/>
@@ -7280,7 +7834,7 @@
             </a:r>
             <a:r>
               <a:rPr lang="en-US" dirty="0" err="1" smtClean="0"/>
-              <a:t>Css</a:t>
+              <a:t>css</a:t>
             </a:r>
             <a:r>
               <a:rPr lang="en-US" dirty="0" smtClean="0"/>
@@ -7288,57 +7842,190 @@
             </a:r>
             <a:r>
               <a:rPr lang="bg-BG" dirty="0" smtClean="0"/>
-              <a:t>селектори демо</a:t>
+              <a:t>селектори</a:t>
             </a:r>
             <a:endParaRPr lang="en-US" dirty="0"/>
           </a:p>
         </p:txBody>
       </p:sp>
-      <p:pic>
-        <p:nvPicPr>
-          <p:cNvPr id="1026" name="Picture 2" descr="http://thecodeistrueorfalse.files.wordpress.com/2013/10/htmlcss-templates1.jpg"/>
-          <p:cNvPicPr>
-            <a:picLocks noChangeAspect="1" noChangeArrowheads="1"/>
-          </p:cNvPicPr>
-          <p:nvPr/>
-        </p:nvPicPr>
-        <p:blipFill>
-          <a:blip r:embed="rId2">
-            <a:extLst>
-              <a:ext uri="{28A0092B-C50C-407E-A947-70E740481C1C}">
-                <a14:useLocalDpi xmlns:a14="http://schemas.microsoft.com/office/drawing/2010/main" val="0"/>
-              </a:ext>
-            </a:extLst>
-          </a:blip>
-          <a:srcRect/>
-          <a:stretch>
-            <a:fillRect/>
-          </a:stretch>
-        </p:blipFill>
-        <p:spPr bwMode="auto">
-          <a:xfrm>
-            <a:off x="3271451" y="815547"/>
-            <a:ext cx="5715000" cy="5715000"/>
-          </a:xfrm>
-          <a:prstGeom prst="rect">
-            <a:avLst/>
-          </a:prstGeom>
-          <a:noFill/>
-          <a:extLst>
-            <a:ext uri="{909E8E84-426E-40DD-AFC4-6F175D3DCCD1}">
-              <a14:hiddenFill xmlns:a14="http://schemas.microsoft.com/office/drawing/2010/main">
-                <a:solidFill>
-                  <a:srgbClr val="FFFFFF"/>
-                </a:solidFill>
-              </a14:hiddenFill>
-            </a:ext>
-          </a:extLst>
-        </p:spPr>
-      </p:pic>
+      <p:sp>
+        <p:nvSpPr>
+          <p:cNvPr id="4" name="Content Placeholder 2"/>
+          <p:cNvSpPr>
+            <a:spLocks noGrp="1"/>
+          </p:cNvSpPr>
+          <p:nvPr>
+            <p:ph sz="quarter" idx="13"/>
+          </p:nvPr>
+        </p:nvSpPr>
+        <p:spPr>
+          <a:xfrm>
+            <a:off x="913774" y="2367092"/>
+            <a:ext cx="10363826" cy="4322032"/>
+          </a:xfrm>
+        </p:spPr>
+        <p:txBody>
+          <a:bodyPr>
+            <a:normAutofit/>
+          </a:bodyPr>
+          <a:lstStyle/>
+          <a:p>
+            <a:r>
+              <a:rPr lang="bg-BG" dirty="0" smtClean="0"/>
+              <a:t>Комбинация от </a:t>
+            </a:r>
+            <a:r>
+              <a:rPr lang="en-US" dirty="0" smtClean="0"/>
+              <a:t>tag </a:t>
+            </a:r>
+            <a:r>
+              <a:rPr lang="bg-BG" dirty="0" smtClean="0"/>
+              <a:t>и клас или от </a:t>
+            </a:r>
+            <a:r>
+              <a:rPr lang="en-US" dirty="0" smtClean="0"/>
+              <a:t>tag </a:t>
+            </a:r>
+            <a:r>
+              <a:rPr lang="bg-BG" dirty="0" smtClean="0"/>
+              <a:t>и </a:t>
+            </a:r>
+            <a:r>
+              <a:rPr lang="en-US" dirty="0" smtClean="0"/>
+              <a:t>id</a:t>
+            </a:r>
+            <a:r>
+              <a:rPr lang="bg-BG" dirty="0"/>
+              <a:t>:</a:t>
+            </a:r>
+            <a:r>
+              <a:rPr lang="bg-BG" dirty="0" smtClean="0"/>
+              <a:t> </a:t>
+            </a:r>
+            <a:r>
+              <a:rPr lang="en-US" dirty="0" smtClean="0"/>
+              <a:t>p.my-class, </a:t>
+            </a:r>
+            <a:r>
+              <a:rPr lang="en-US" dirty="0" err="1" smtClean="0"/>
+              <a:t>p#first-id</a:t>
+            </a:r>
+            <a:endParaRPr lang="en-US" dirty="0" smtClean="0"/>
+          </a:p>
+          <a:p>
+            <a:r>
+              <a:rPr lang="bg-BG" dirty="0" smtClean="0"/>
+              <a:t>Вложен селектор</a:t>
+            </a:r>
+            <a:r>
+              <a:rPr lang="bg-BG" dirty="0"/>
+              <a:t>:</a:t>
+            </a:r>
+            <a:r>
+              <a:rPr lang="en-US" dirty="0" smtClean="0"/>
+              <a:t> body div</a:t>
+            </a:r>
+          </a:p>
+          <a:p>
+            <a:r>
+              <a:rPr lang="bg-BG" dirty="0" smtClean="0"/>
+              <a:t>Селектор *</a:t>
+            </a:r>
+          </a:p>
+          <a:p>
+            <a:r>
+              <a:rPr lang="bg-BG" dirty="0" smtClean="0"/>
+              <a:t>Селектор за директни деца: </a:t>
+            </a:r>
+            <a:r>
+              <a:rPr lang="en-US" dirty="0" smtClean="0"/>
+              <a:t>div &gt; p</a:t>
+            </a:r>
+          </a:p>
+          <a:p>
+            <a:r>
+              <a:rPr lang="bg-BG" dirty="0" smtClean="0"/>
+              <a:t>Селектор за съседни елементи: </a:t>
+            </a:r>
+            <a:r>
+              <a:rPr lang="en-US" dirty="0" err="1" smtClean="0"/>
+              <a:t>img</a:t>
+            </a:r>
+            <a:r>
+              <a:rPr lang="en-US" dirty="0" smtClean="0"/>
+              <a:t> + div</a:t>
+            </a:r>
+          </a:p>
+          <a:p>
+            <a:r>
+              <a:rPr lang="bg-BG" dirty="0" smtClean="0"/>
+              <a:t>Селектор за  атрибути</a:t>
+            </a:r>
+            <a:r>
+              <a:rPr lang="en-US" dirty="0" smtClean="0"/>
+              <a:t>: </a:t>
+            </a:r>
+            <a:r>
+              <a:rPr lang="en-US" dirty="0"/>
+              <a:t>input[type="button</a:t>
+            </a:r>
+            <a:r>
+              <a:rPr lang="en-US" dirty="0" smtClean="0"/>
+              <a:t>"]</a:t>
+            </a:r>
+            <a:endParaRPr lang="bg-BG" dirty="0" smtClean="0"/>
+          </a:p>
+          <a:p>
+            <a:r>
+              <a:rPr lang="bg-BG" dirty="0" smtClean="0"/>
+              <a:t>Информация за останалите </a:t>
+            </a:r>
+            <a:r>
+              <a:rPr lang="en-US" dirty="0" err="1" smtClean="0"/>
+              <a:t>css</a:t>
+            </a:r>
+            <a:r>
+              <a:rPr lang="en-US" dirty="0" smtClean="0"/>
+              <a:t> </a:t>
+            </a:r>
+            <a:r>
+              <a:rPr lang="bg-BG" dirty="0" smtClean="0"/>
+              <a:t>селектори може да намерите тук:</a:t>
+            </a:r>
+          </a:p>
+          <a:p>
+            <a:pPr marL="0" indent="0">
+              <a:buNone/>
+            </a:pPr>
+            <a:r>
+              <a:rPr lang="en-US" dirty="0">
+                <a:hlinkClick r:id="rId2"/>
+              </a:rPr>
+              <a:t>http://</a:t>
+            </a:r>
+            <a:r>
+              <a:rPr lang="en-US" dirty="0" smtClean="0">
+                <a:hlinkClick r:id="rId2"/>
+              </a:rPr>
+              <a:t>www.w3schools.com/cssref/css_selectors.asp</a:t>
+            </a:r>
+            <a:endParaRPr lang="bg-BG" dirty="0" smtClean="0"/>
+          </a:p>
+          <a:p>
+            <a:pPr marL="0" indent="0">
+              <a:buNone/>
+            </a:pPr>
+            <a:endParaRPr lang="bg-BG" dirty="0" smtClean="0"/>
+          </a:p>
+          <a:p>
+            <a:endParaRPr lang="en-US" dirty="0"/>
+          </a:p>
+        </p:txBody>
+      </p:sp>
     </p:spTree>
     <p:extLst>
       <p:ext uri="{BB962C8B-B14F-4D97-AF65-F5344CB8AC3E}">
-        <p14:creationId xmlns:p14="http://schemas.microsoft.com/office/powerpoint/2010/main" val="525426709"/>
+        <p14:creationId xmlns:p14="http://schemas.microsoft.com/office/powerpoint/2010/main" val="1981217362"/>
       </p:ext>
     </p:extLst>
   </p:cSld>
@@ -7375,11 +8062,20 @@
             <p:ph type="title"/>
           </p:nvPr>
         </p:nvSpPr>
-        <p:spPr/>
-        <p:txBody>
-          <a:bodyPr/>
-          <a:lstStyle/>
-          <a:p>
+        <p:spPr>
+          <a:xfrm>
+            <a:off x="946726" y="91296"/>
+            <a:ext cx="10364451" cy="724251"/>
+          </a:xfrm>
+        </p:spPr>
+        <p:txBody>
+          <a:bodyPr/>
+          <a:lstStyle/>
+          <a:p>
+            <a:r>
+              <a:rPr lang="bg-BG" dirty="0" smtClean="0"/>
+              <a:t>Други </a:t>
+            </a:r>
             <a:r>
               <a:rPr lang="en-US" dirty="0" err="1" smtClean="0"/>
               <a:t>Css</a:t>
@@ -7390,78 +8086,57 @@
             </a:r>
             <a:r>
               <a:rPr lang="bg-BG" dirty="0" smtClean="0"/>
-              <a:t>стойности</a:t>
+              <a:t>селектори демо</a:t>
             </a:r>
             <a:endParaRPr lang="en-US" dirty="0"/>
           </a:p>
         </p:txBody>
       </p:sp>
-      <p:sp>
-        <p:nvSpPr>
-          <p:cNvPr id="3" name="Content Placeholder 2"/>
-          <p:cNvSpPr>
-            <a:spLocks noGrp="1"/>
-          </p:cNvSpPr>
-          <p:nvPr>
-            <p:ph sz="quarter" idx="13"/>
-          </p:nvPr>
-        </p:nvSpPr>
-        <p:spPr/>
-        <p:txBody>
-          <a:bodyPr/>
-          <a:lstStyle/>
-          <a:p>
-            <a:r>
-              <a:rPr lang="bg-BG" dirty="0" smtClean="0"/>
-              <a:t>Всички стойности представляват двойки ключ стойност</a:t>
-            </a:r>
-          </a:p>
-          <a:p>
-            <a:r>
-              <a:rPr lang="bg-BG" dirty="0" smtClean="0"/>
-              <a:t>Някой </a:t>
-            </a:r>
-            <a:r>
-              <a:rPr lang="en-US" dirty="0" err="1" smtClean="0"/>
-              <a:t>css</a:t>
-            </a:r>
-            <a:r>
-              <a:rPr lang="en-US" dirty="0" smtClean="0"/>
-              <a:t> </a:t>
-            </a:r>
-            <a:r>
-              <a:rPr lang="bg-BG" dirty="0" smtClean="0"/>
-              <a:t>стойности важат за всички елементи, други са предназначени за определен тип такива</a:t>
-            </a:r>
-          </a:p>
-          <a:p>
-            <a:r>
-              <a:rPr lang="en-US" dirty="0" err="1" smtClean="0"/>
-              <a:t>Css</a:t>
-            </a:r>
-            <a:r>
-              <a:rPr lang="en-US" dirty="0" smtClean="0"/>
-              <a:t> </a:t>
-            </a:r>
-            <a:r>
-              <a:rPr lang="bg-BG" dirty="0" smtClean="0"/>
-              <a:t>може да определя – отстояние</a:t>
-            </a:r>
-            <a:r>
-              <a:rPr lang="en-US" dirty="0" smtClean="0"/>
-              <a:t>, </a:t>
-            </a:r>
-            <a:r>
-              <a:rPr lang="bg-BG" dirty="0" smtClean="0"/>
-              <a:t>цвят, размери, граници, шрифт, формат и др.</a:t>
-            </a:r>
-          </a:p>
-        </p:txBody>
-      </p:sp>
+      <p:pic>
+        <p:nvPicPr>
+          <p:cNvPr id="1026" name="Picture 2" descr="http://thecodeistrueorfalse.files.wordpress.com/2013/10/htmlcss-templates1.jpg"/>
+          <p:cNvPicPr>
+            <a:picLocks noChangeAspect="1" noChangeArrowheads="1"/>
+          </p:cNvPicPr>
+          <p:nvPr/>
+        </p:nvPicPr>
+        <p:blipFill>
+          <a:blip r:embed="rId2">
+            <a:extLst>
+              <a:ext uri="{28A0092B-C50C-407E-A947-70E740481C1C}">
+                <a14:useLocalDpi xmlns:a14="http://schemas.microsoft.com/office/drawing/2010/main" val="0"/>
+              </a:ext>
+            </a:extLst>
+          </a:blip>
+          <a:srcRect/>
+          <a:stretch>
+            <a:fillRect/>
+          </a:stretch>
+        </p:blipFill>
+        <p:spPr bwMode="auto">
+          <a:xfrm>
+            <a:off x="3271451" y="815547"/>
+            <a:ext cx="5715000" cy="5715000"/>
+          </a:xfrm>
+          <a:prstGeom prst="rect">
+            <a:avLst/>
+          </a:prstGeom>
+          <a:noFill/>
+          <a:extLst>
+            <a:ext uri="{909E8E84-426E-40DD-AFC4-6F175D3DCCD1}">
+              <a14:hiddenFill xmlns:a14="http://schemas.microsoft.com/office/drawing/2010/main">
+                <a:solidFill>
+                  <a:srgbClr val="FFFFFF"/>
+                </a:solidFill>
+              </a14:hiddenFill>
+            </a:ext>
+          </a:extLst>
+        </p:spPr>
+      </p:pic>
     </p:spTree>
     <p:extLst>
       <p:ext uri="{BB962C8B-B14F-4D97-AF65-F5344CB8AC3E}">
-        <p14:creationId xmlns:p14="http://schemas.microsoft.com/office/powerpoint/2010/main" val="2199536310"/>
+        <p14:creationId xmlns:p14="http://schemas.microsoft.com/office/powerpoint/2010/main" val="525426709"/>
       </p:ext>
     </p:extLst>
   </p:cSld>
@@ -7504,16 +8179,16 @@
           <a:lstStyle/>
           <a:p>
             <a:r>
-              <a:rPr lang="en-US" dirty="0" err="1"/>
+              <a:rPr lang="en-US" dirty="0" err="1" smtClean="0"/>
               <a:t>Css</a:t>
             </a:r>
             <a:r>
-              <a:rPr lang="en-US" dirty="0"/>
+              <a:rPr lang="en-US" dirty="0" smtClean="0"/>
               <a:t> </a:t>
             </a:r>
             <a:r>
               <a:rPr lang="bg-BG" dirty="0" smtClean="0"/>
-              <a:t>стойности за цвят</a:t>
+              <a:t>стойности</a:t>
             </a:r>
             <a:endParaRPr lang="en-US" dirty="0"/>
           </a:p>
@@ -7536,28 +8211,55 @@
           <a:p>
             <a:r>
               <a:rPr lang="bg-BG" dirty="0" smtClean="0"/>
-              <a:t>Видове стойности</a:t>
+              <a:t>Всички стойности представляват двойки ключ стойност</a:t>
             </a:r>
           </a:p>
           <a:p>
             <a:r>
               <a:rPr lang="bg-BG" dirty="0" smtClean="0"/>
-              <a:t>Видове цветове</a:t>
-            </a:r>
-          </a:p>
-          <a:p>
+              <a:t>Някой </a:t>
+            </a:r>
+            <a:r>
+              <a:rPr lang="en-US" dirty="0" err="1" smtClean="0"/>
+              <a:t>css</a:t>
+            </a:r>
+            <a:r>
+              <a:rPr lang="en-US" dirty="0" smtClean="0"/>
+              <a:t> </a:t>
+            </a:r>
             <a:r>
               <a:rPr lang="bg-BG" dirty="0" smtClean="0"/>
-              <a:t>Добри практики</a:t>
-            </a:r>
-            <a:endParaRPr lang="en-US" dirty="0"/>
+              <a:t>стойности важат за всички елементи, други са предназначени за определен тип такива</a:t>
+            </a:r>
+          </a:p>
+          <a:p>
+            <a:r>
+              <a:rPr lang="en-US" dirty="0" err="1" smtClean="0"/>
+              <a:t>Css</a:t>
+            </a:r>
+            <a:r>
+              <a:rPr lang="en-US" dirty="0" smtClean="0"/>
+              <a:t> </a:t>
+            </a:r>
+            <a:r>
+              <a:rPr lang="bg-BG" dirty="0" smtClean="0"/>
+              <a:t>може да определя – отстояние</a:t>
+            </a:r>
+            <a:r>
+              <a:rPr lang="en-US" dirty="0" smtClean="0"/>
+              <a:t>, </a:t>
+            </a:r>
+            <a:r>
+              <a:rPr lang="bg-BG" dirty="0" smtClean="0"/>
+              <a:t>цвят, размери, граници, шрифт, формат и др.</a:t>
+            </a:r>
           </a:p>
         </p:txBody>
       </p:sp>
     </p:spTree>
     <p:extLst>
       <p:ext uri="{BB962C8B-B14F-4D97-AF65-F5344CB8AC3E}">
-        <p14:creationId xmlns:p14="http://schemas.microsoft.com/office/powerpoint/2010/main" val="3554447020"/>
+        <p14:creationId xmlns:p14="http://schemas.microsoft.com/office/powerpoint/2010/main" val="2199536310"/>
       </p:ext>
     </p:extLst>
   </p:cSld>

</xml_diff>